<commit_message>
Integrata la relazione con DFS
</commit_message>
<xml_diff>
--- a/relazione/doc per relazione/scacchiera.pptx
+++ b/relazione/doc per relazione/scacchiera.pptx
@@ -14,6 +14,7 @@
     <p:sldId id="262" r:id="rId8"/>
     <p:sldId id="263" r:id="rId9"/>
     <p:sldId id="264" r:id="rId10"/>
+    <p:sldId id="265" r:id="rId11"/>
   </p:sldIdLst>
   <p:sldSz cx="12192000" cy="6858000"/>
   <p:notesSz cx="6858000" cy="9144000"/>
@@ -112,6 +113,11 @@
       </a:defRPr>
     </a:lvl9pPr>
   </p:defaultTextStyle>
+  <p:extLst>
+    <p:ext uri="{EFAFB233-063F-42B5-8137-9DF3F51BA10A}">
+      <p15:sldGuideLst xmlns:p15="http://schemas.microsoft.com/office/powerpoint/2012/main"/>
+    </p:ext>
+  </p:extLst>
 </p:presentation>
 </file>
 
@@ -5022,6 +5028,1853 @@
 </p:sld>
 </file>
 
+<file path=ppt/slides/slide10.xml><?xml version="1.0" encoding="utf-8"?>
+<p:sld xmlns:a="http://schemas.openxmlformats.org/drawingml/2006/main" xmlns:r="http://schemas.openxmlformats.org/officeDocument/2006/relationships" xmlns:p="http://schemas.openxmlformats.org/presentationml/2006/main">
+  <p:cSld>
+    <p:spTree>
+      <p:nvGrpSpPr>
+        <p:cNvPr id="1" name=""/>
+        <p:cNvGrpSpPr/>
+        <p:nvPr/>
+      </p:nvGrpSpPr>
+      <p:grpSpPr>
+        <a:xfrm>
+          <a:off x="0" y="0"/>
+          <a:ext cx="0" cy="0"/>
+          <a:chOff x="0" y="0"/>
+          <a:chExt cx="0" cy="0"/>
+        </a:xfrm>
+      </p:grpSpPr>
+      <p:graphicFrame>
+        <p:nvGraphicFramePr>
+          <p:cNvPr id="4" name="Tabella 3">
+            <a:extLst>
+              <a:ext uri="{FF2B5EF4-FFF2-40B4-BE49-F238E27FC236}">
+                <a16:creationId xmlns:a16="http://schemas.microsoft.com/office/drawing/2014/main" id="{38791F8C-C9FF-7D54-71D3-DF4831E8746C}"/>
+              </a:ext>
+            </a:extLst>
+          </p:cNvPr>
+          <p:cNvGraphicFramePr>
+            <a:graphicFrameLocks noGrp="1"/>
+          </p:cNvGraphicFramePr>
+          <p:nvPr>
+            <p:extLst>
+              <p:ext uri="{D42A27DB-BD31-4B8C-83A1-F6EECF244321}">
+                <p14:modId xmlns:p14="http://schemas.microsoft.com/office/powerpoint/2010/main" val="2390309797"/>
+              </p:ext>
+            </p:extLst>
+          </p:nvPr>
+        </p:nvGraphicFramePr>
+        <p:xfrm>
+          <a:off x="4112207" y="1308605"/>
+          <a:ext cx="3967585" cy="3961390"/>
+        </p:xfrm>
+        <a:graphic>
+          <a:graphicData uri="http://schemas.openxmlformats.org/drawingml/2006/table">
+            <a:tbl>
+              <a:tblPr firstRow="1" bandRow="1">
+                <a:tableStyleId>{5C22544A-7EE6-4342-B048-85BDC9FD1C3A}</a:tableStyleId>
+              </a:tblPr>
+              <a:tblGrid>
+                <a:gridCol w="793517">
+                  <a:extLst>
+                    <a:ext uri="{9D8B030D-6E8A-4147-A177-3AD203B41FA5}">
+                      <a16:colId xmlns:a16="http://schemas.microsoft.com/office/drawing/2014/main" val="953426501"/>
+                    </a:ext>
+                  </a:extLst>
+                </a:gridCol>
+                <a:gridCol w="793517">
+                  <a:extLst>
+                    <a:ext uri="{9D8B030D-6E8A-4147-A177-3AD203B41FA5}">
+                      <a16:colId xmlns:a16="http://schemas.microsoft.com/office/drawing/2014/main" val="2390328143"/>
+                    </a:ext>
+                  </a:extLst>
+                </a:gridCol>
+                <a:gridCol w="793517">
+                  <a:extLst>
+                    <a:ext uri="{9D8B030D-6E8A-4147-A177-3AD203B41FA5}">
+                      <a16:colId xmlns:a16="http://schemas.microsoft.com/office/drawing/2014/main" val="3173013275"/>
+                    </a:ext>
+                  </a:extLst>
+                </a:gridCol>
+                <a:gridCol w="793517">
+                  <a:extLst>
+                    <a:ext uri="{9D8B030D-6E8A-4147-A177-3AD203B41FA5}">
+                      <a16:colId xmlns:a16="http://schemas.microsoft.com/office/drawing/2014/main" val="2480509144"/>
+                    </a:ext>
+                  </a:extLst>
+                </a:gridCol>
+                <a:gridCol w="793517">
+                  <a:extLst>
+                    <a:ext uri="{9D8B030D-6E8A-4147-A177-3AD203B41FA5}">
+                      <a16:colId xmlns:a16="http://schemas.microsoft.com/office/drawing/2014/main" val="2976673278"/>
+                    </a:ext>
+                  </a:extLst>
+                </a:gridCol>
+              </a:tblGrid>
+              <a:tr h="792278">
+                <a:tc>
+                  <a:txBody>
+                    <a:bodyPr/>
+                    <a:lstStyle/>
+                    <a:p>
+                      <a:pPr algn="ctr"/>
+                      <a:endParaRPr lang="it-IT" sz="3600" b="0" dirty="0">
+                        <a:solidFill>
+                          <a:schemeClr val="tx1"/>
+                        </a:solidFill>
+                      </a:endParaRPr>
+                    </a:p>
+                  </a:txBody>
+                  <a:tcPr anchor="ctr">
+                    <a:lnL w="12700" cap="flat" cmpd="sng" algn="ctr">
+                      <a:solidFill>
+                        <a:schemeClr val="tx1"/>
+                      </a:solidFill>
+                      <a:prstDash val="solid"/>
+                      <a:round/>
+                      <a:headEnd type="none" w="med" len="med"/>
+                      <a:tailEnd type="none" w="med" len="med"/>
+                    </a:lnL>
+                    <a:lnR w="12700" cap="flat" cmpd="sng" algn="ctr">
+                      <a:solidFill>
+                        <a:schemeClr val="tx1"/>
+                      </a:solidFill>
+                      <a:prstDash val="solid"/>
+                      <a:round/>
+                      <a:headEnd type="none" w="med" len="med"/>
+                      <a:tailEnd type="none" w="med" len="med"/>
+                    </a:lnR>
+                    <a:lnT w="12700" cap="flat" cmpd="sng" algn="ctr">
+                      <a:solidFill>
+                        <a:schemeClr val="tx1"/>
+                      </a:solidFill>
+                      <a:prstDash val="solid"/>
+                      <a:round/>
+                      <a:headEnd type="none" w="med" len="med"/>
+                      <a:tailEnd type="none" w="med" len="med"/>
+                    </a:lnT>
+                    <a:lnB w="12700" cap="flat" cmpd="sng" algn="ctr">
+                      <a:solidFill>
+                        <a:schemeClr val="tx1"/>
+                      </a:solidFill>
+                      <a:prstDash val="solid"/>
+                      <a:round/>
+                      <a:headEnd type="none" w="med" len="med"/>
+                      <a:tailEnd type="none" w="med" len="med"/>
+                    </a:lnB>
+                    <a:solidFill>
+                      <a:srgbClr val="779556"/>
+                    </a:solidFill>
+                  </a:tcPr>
+                </a:tc>
+                <a:tc>
+                  <a:txBody>
+                    <a:bodyPr/>
+                    <a:lstStyle/>
+                    <a:p>
+                      <a:pPr algn="ctr"/>
+                      <a:r>
+                        <a:rPr lang="it-IT" sz="3600" b="0" dirty="0">
+                          <a:solidFill>
+                            <a:schemeClr val="tx1"/>
+                          </a:solidFill>
+                        </a:rPr>
+                        <a:t>2</a:t>
+                      </a:r>
+                    </a:p>
+                  </a:txBody>
+                  <a:tcPr anchor="ctr">
+                    <a:lnL w="12700" cap="flat" cmpd="sng" algn="ctr">
+                      <a:solidFill>
+                        <a:schemeClr val="tx1"/>
+                      </a:solidFill>
+                      <a:prstDash val="solid"/>
+                      <a:round/>
+                      <a:headEnd type="none" w="med" len="med"/>
+                      <a:tailEnd type="none" w="med" len="med"/>
+                    </a:lnL>
+                    <a:lnR w="12700" cap="flat" cmpd="sng" algn="ctr">
+                      <a:solidFill>
+                        <a:schemeClr val="tx1"/>
+                      </a:solidFill>
+                      <a:prstDash val="solid"/>
+                      <a:round/>
+                      <a:headEnd type="none" w="med" len="med"/>
+                      <a:tailEnd type="none" w="med" len="med"/>
+                    </a:lnR>
+                    <a:lnT w="12700" cap="flat" cmpd="sng" algn="ctr">
+                      <a:solidFill>
+                        <a:schemeClr val="tx1"/>
+                      </a:solidFill>
+                      <a:prstDash val="solid"/>
+                      <a:round/>
+                      <a:headEnd type="none" w="med" len="med"/>
+                      <a:tailEnd type="none" w="med" len="med"/>
+                    </a:lnT>
+                    <a:lnB w="12700" cap="flat" cmpd="sng" algn="ctr">
+                      <a:solidFill>
+                        <a:schemeClr val="tx1"/>
+                      </a:solidFill>
+                      <a:prstDash val="solid"/>
+                      <a:round/>
+                      <a:headEnd type="none" w="med" len="med"/>
+                      <a:tailEnd type="none" w="med" len="med"/>
+                    </a:lnB>
+                    <a:solidFill>
+                      <a:srgbClr val="EBECD0"/>
+                    </a:solidFill>
+                  </a:tcPr>
+                </a:tc>
+                <a:tc>
+                  <a:txBody>
+                    <a:bodyPr/>
+                    <a:lstStyle/>
+                    <a:p>
+                      <a:pPr algn="ctr"/>
+                      <a:endParaRPr lang="it-IT" sz="3600" b="0" dirty="0">
+                        <a:solidFill>
+                          <a:schemeClr val="tx1"/>
+                        </a:solidFill>
+                      </a:endParaRPr>
+                    </a:p>
+                  </a:txBody>
+                  <a:tcPr anchor="ctr">
+                    <a:lnL w="12700" cap="flat" cmpd="sng" algn="ctr">
+                      <a:solidFill>
+                        <a:schemeClr val="tx1"/>
+                      </a:solidFill>
+                      <a:prstDash val="solid"/>
+                      <a:round/>
+                      <a:headEnd type="none" w="med" len="med"/>
+                      <a:tailEnd type="none" w="med" len="med"/>
+                    </a:lnL>
+                    <a:lnR w="12700" cap="flat" cmpd="sng" algn="ctr">
+                      <a:solidFill>
+                        <a:schemeClr val="tx1"/>
+                      </a:solidFill>
+                      <a:prstDash val="solid"/>
+                      <a:round/>
+                      <a:headEnd type="none" w="med" len="med"/>
+                      <a:tailEnd type="none" w="med" len="med"/>
+                    </a:lnR>
+                    <a:lnT w="12700" cap="flat" cmpd="sng" algn="ctr">
+                      <a:solidFill>
+                        <a:schemeClr val="tx1"/>
+                      </a:solidFill>
+                      <a:prstDash val="solid"/>
+                      <a:round/>
+                      <a:headEnd type="none" w="med" len="med"/>
+                      <a:tailEnd type="none" w="med" len="med"/>
+                    </a:lnT>
+                    <a:lnB w="12700" cap="flat" cmpd="sng" algn="ctr">
+                      <a:solidFill>
+                        <a:schemeClr val="tx1"/>
+                      </a:solidFill>
+                      <a:prstDash val="solid"/>
+                      <a:round/>
+                      <a:headEnd type="none" w="med" len="med"/>
+                      <a:tailEnd type="none" w="med" len="med"/>
+                    </a:lnB>
+                    <a:solidFill>
+                      <a:srgbClr val="779556"/>
+                    </a:solidFill>
+                  </a:tcPr>
+                </a:tc>
+                <a:tc>
+                  <a:txBody>
+                    <a:bodyPr/>
+                    <a:lstStyle/>
+                    <a:p>
+                      <a:pPr algn="ctr"/>
+                      <a:endParaRPr lang="it-IT" sz="3600" b="0" dirty="0">
+                        <a:solidFill>
+                          <a:schemeClr val="tx1"/>
+                        </a:solidFill>
+                      </a:endParaRPr>
+                    </a:p>
+                  </a:txBody>
+                  <a:tcPr anchor="ctr">
+                    <a:lnL w="12700" cap="flat" cmpd="sng" algn="ctr">
+                      <a:solidFill>
+                        <a:schemeClr val="tx1"/>
+                      </a:solidFill>
+                      <a:prstDash val="solid"/>
+                      <a:round/>
+                      <a:headEnd type="none" w="med" len="med"/>
+                      <a:tailEnd type="none" w="med" len="med"/>
+                    </a:lnL>
+                    <a:lnR w="12700" cap="flat" cmpd="sng" algn="ctr">
+                      <a:solidFill>
+                        <a:schemeClr val="tx1"/>
+                      </a:solidFill>
+                      <a:prstDash val="solid"/>
+                      <a:round/>
+                      <a:headEnd type="none" w="med" len="med"/>
+                      <a:tailEnd type="none" w="med" len="med"/>
+                    </a:lnR>
+                    <a:lnT w="12700" cap="flat" cmpd="sng" algn="ctr">
+                      <a:solidFill>
+                        <a:schemeClr val="tx1"/>
+                      </a:solidFill>
+                      <a:prstDash val="solid"/>
+                      <a:round/>
+                      <a:headEnd type="none" w="med" len="med"/>
+                      <a:tailEnd type="none" w="med" len="med"/>
+                    </a:lnT>
+                    <a:lnB w="12700" cap="flat" cmpd="sng" algn="ctr">
+                      <a:solidFill>
+                        <a:schemeClr val="tx1"/>
+                      </a:solidFill>
+                      <a:prstDash val="solid"/>
+                      <a:round/>
+                      <a:headEnd type="none" w="med" len="med"/>
+                      <a:tailEnd type="none" w="med" len="med"/>
+                    </a:lnB>
+                    <a:solidFill>
+                      <a:srgbClr val="EBECD0"/>
+                    </a:solidFill>
+                  </a:tcPr>
+                </a:tc>
+                <a:tc>
+                  <a:txBody>
+                    <a:bodyPr/>
+                    <a:lstStyle/>
+                    <a:p>
+                      <a:pPr algn="ctr"/>
+                      <a:endParaRPr lang="it-IT" sz="3600" b="0" dirty="0">
+                        <a:solidFill>
+                          <a:schemeClr val="tx1"/>
+                        </a:solidFill>
+                      </a:endParaRPr>
+                    </a:p>
+                  </a:txBody>
+                  <a:tcPr anchor="ctr">
+                    <a:lnL w="12700" cap="flat" cmpd="sng" algn="ctr">
+                      <a:solidFill>
+                        <a:schemeClr val="tx1"/>
+                      </a:solidFill>
+                      <a:prstDash val="solid"/>
+                      <a:round/>
+                      <a:headEnd type="none" w="med" len="med"/>
+                      <a:tailEnd type="none" w="med" len="med"/>
+                    </a:lnL>
+                    <a:lnR w="12700" cap="flat" cmpd="sng" algn="ctr">
+                      <a:solidFill>
+                        <a:schemeClr val="tx1"/>
+                      </a:solidFill>
+                      <a:prstDash val="solid"/>
+                      <a:round/>
+                      <a:headEnd type="none" w="med" len="med"/>
+                      <a:tailEnd type="none" w="med" len="med"/>
+                    </a:lnR>
+                    <a:lnT w="12700" cap="flat" cmpd="sng" algn="ctr">
+                      <a:solidFill>
+                        <a:schemeClr val="tx1"/>
+                      </a:solidFill>
+                      <a:prstDash val="solid"/>
+                      <a:round/>
+                      <a:headEnd type="none" w="med" len="med"/>
+                      <a:tailEnd type="none" w="med" len="med"/>
+                    </a:lnT>
+                    <a:lnB w="12700" cap="flat" cmpd="sng" algn="ctr">
+                      <a:solidFill>
+                        <a:schemeClr val="tx1"/>
+                      </a:solidFill>
+                      <a:prstDash val="solid"/>
+                      <a:round/>
+                      <a:headEnd type="none" w="med" len="med"/>
+                      <a:tailEnd type="none" w="med" len="med"/>
+                    </a:lnB>
+                    <a:solidFill>
+                      <a:srgbClr val="779556"/>
+                    </a:solidFill>
+                  </a:tcPr>
+                </a:tc>
+                <a:extLst>
+                  <a:ext uri="{0D108BD9-81ED-4DB2-BD59-A6C34878D82A}">
+                    <a16:rowId xmlns:a16="http://schemas.microsoft.com/office/drawing/2014/main" val="2377454469"/>
+                  </a:ext>
+                </a:extLst>
+              </a:tr>
+              <a:tr h="792278">
+                <a:tc>
+                  <a:txBody>
+                    <a:bodyPr/>
+                    <a:lstStyle/>
+                    <a:p>
+                      <a:pPr algn="ctr"/>
+                      <a:endParaRPr lang="it-IT" sz="3600" b="0" dirty="0">
+                        <a:solidFill>
+                          <a:schemeClr val="tx1"/>
+                        </a:solidFill>
+                      </a:endParaRPr>
+                    </a:p>
+                  </a:txBody>
+                  <a:tcPr anchor="ctr">
+                    <a:lnL w="12700" cap="flat" cmpd="sng" algn="ctr">
+                      <a:solidFill>
+                        <a:schemeClr val="tx1"/>
+                      </a:solidFill>
+                      <a:prstDash val="solid"/>
+                      <a:round/>
+                      <a:headEnd type="none" w="med" len="med"/>
+                      <a:tailEnd type="none" w="med" len="med"/>
+                    </a:lnL>
+                    <a:lnR w="12700" cap="flat" cmpd="sng" algn="ctr">
+                      <a:solidFill>
+                        <a:schemeClr val="tx1"/>
+                      </a:solidFill>
+                      <a:prstDash val="solid"/>
+                      <a:round/>
+                      <a:headEnd type="none" w="med" len="med"/>
+                      <a:tailEnd type="none" w="med" len="med"/>
+                    </a:lnR>
+                    <a:lnT w="12700" cap="flat" cmpd="sng" algn="ctr">
+                      <a:solidFill>
+                        <a:schemeClr val="tx1"/>
+                      </a:solidFill>
+                      <a:prstDash val="solid"/>
+                      <a:round/>
+                      <a:headEnd type="none" w="med" len="med"/>
+                      <a:tailEnd type="none" w="med" len="med"/>
+                    </a:lnT>
+                    <a:lnB w="12700" cap="flat" cmpd="sng" algn="ctr">
+                      <a:solidFill>
+                        <a:schemeClr val="tx1"/>
+                      </a:solidFill>
+                      <a:prstDash val="solid"/>
+                      <a:round/>
+                      <a:headEnd type="none" w="med" len="med"/>
+                      <a:tailEnd type="none" w="med" len="med"/>
+                    </a:lnB>
+                    <a:solidFill>
+                      <a:srgbClr val="EBECD0"/>
+                    </a:solidFill>
+                  </a:tcPr>
+                </a:tc>
+                <a:tc>
+                  <a:txBody>
+                    <a:bodyPr/>
+                    <a:lstStyle/>
+                    <a:p>
+                      <a:pPr algn="ctr"/>
+                      <a:endParaRPr lang="it-IT" sz="3600" b="0" dirty="0">
+                        <a:solidFill>
+                          <a:schemeClr val="tx1"/>
+                        </a:solidFill>
+                      </a:endParaRPr>
+                    </a:p>
+                  </a:txBody>
+                  <a:tcPr anchor="ctr">
+                    <a:lnL w="12700" cap="flat" cmpd="sng" algn="ctr">
+                      <a:solidFill>
+                        <a:schemeClr val="tx1"/>
+                      </a:solidFill>
+                      <a:prstDash val="solid"/>
+                      <a:round/>
+                      <a:headEnd type="none" w="med" len="med"/>
+                      <a:tailEnd type="none" w="med" len="med"/>
+                    </a:lnL>
+                    <a:lnR w="12700" cap="flat" cmpd="sng" algn="ctr">
+                      <a:solidFill>
+                        <a:schemeClr val="tx1"/>
+                      </a:solidFill>
+                      <a:prstDash val="solid"/>
+                      <a:round/>
+                      <a:headEnd type="none" w="med" len="med"/>
+                      <a:tailEnd type="none" w="med" len="med"/>
+                    </a:lnR>
+                    <a:lnT w="12700" cap="flat" cmpd="sng" algn="ctr">
+                      <a:solidFill>
+                        <a:schemeClr val="tx1"/>
+                      </a:solidFill>
+                      <a:prstDash val="solid"/>
+                      <a:round/>
+                      <a:headEnd type="none" w="med" len="med"/>
+                      <a:tailEnd type="none" w="med" len="med"/>
+                    </a:lnT>
+                    <a:lnB w="12700" cap="flat" cmpd="sng" algn="ctr">
+                      <a:solidFill>
+                        <a:schemeClr val="tx1"/>
+                      </a:solidFill>
+                      <a:prstDash val="solid"/>
+                      <a:round/>
+                      <a:headEnd type="none" w="med" len="med"/>
+                      <a:tailEnd type="none" w="med" len="med"/>
+                    </a:lnB>
+                    <a:solidFill>
+                      <a:srgbClr val="779556"/>
+                    </a:solidFill>
+                  </a:tcPr>
+                </a:tc>
+                <a:tc>
+                  <a:txBody>
+                    <a:bodyPr/>
+                    <a:lstStyle/>
+                    <a:p>
+                      <a:pPr algn="ctr"/>
+                      <a:endParaRPr lang="it-IT" sz="3600" b="0" dirty="0">
+                        <a:solidFill>
+                          <a:schemeClr val="tx1"/>
+                        </a:solidFill>
+                      </a:endParaRPr>
+                    </a:p>
+                  </a:txBody>
+                  <a:tcPr anchor="ctr">
+                    <a:lnL w="12700" cap="flat" cmpd="sng" algn="ctr">
+                      <a:solidFill>
+                        <a:schemeClr val="tx1"/>
+                      </a:solidFill>
+                      <a:prstDash val="solid"/>
+                      <a:round/>
+                      <a:headEnd type="none" w="med" len="med"/>
+                      <a:tailEnd type="none" w="med" len="med"/>
+                    </a:lnL>
+                    <a:lnR w="12700" cap="flat" cmpd="sng" algn="ctr">
+                      <a:solidFill>
+                        <a:schemeClr val="tx1"/>
+                      </a:solidFill>
+                      <a:prstDash val="solid"/>
+                      <a:round/>
+                      <a:headEnd type="none" w="med" len="med"/>
+                      <a:tailEnd type="none" w="med" len="med"/>
+                    </a:lnR>
+                    <a:lnT w="12700" cap="flat" cmpd="sng" algn="ctr">
+                      <a:solidFill>
+                        <a:schemeClr val="tx1"/>
+                      </a:solidFill>
+                      <a:prstDash val="solid"/>
+                      <a:round/>
+                      <a:headEnd type="none" w="med" len="med"/>
+                      <a:tailEnd type="none" w="med" len="med"/>
+                    </a:lnT>
+                    <a:lnB w="12700" cap="flat" cmpd="sng" algn="ctr">
+                      <a:solidFill>
+                        <a:schemeClr val="tx1"/>
+                      </a:solidFill>
+                      <a:prstDash val="solid"/>
+                      <a:round/>
+                      <a:headEnd type="none" w="med" len="med"/>
+                      <a:tailEnd type="none" w="med" len="med"/>
+                    </a:lnB>
+                    <a:solidFill>
+                      <a:srgbClr val="EBECD0"/>
+                    </a:solidFill>
+                  </a:tcPr>
+                </a:tc>
+                <a:tc>
+                  <a:txBody>
+                    <a:bodyPr/>
+                    <a:lstStyle/>
+                    <a:p>
+                      <a:pPr algn="ctr"/>
+                      <a:endParaRPr lang="it-IT" sz="3600" b="0" dirty="0">
+                        <a:solidFill>
+                          <a:schemeClr val="tx1"/>
+                        </a:solidFill>
+                      </a:endParaRPr>
+                    </a:p>
+                  </a:txBody>
+                  <a:tcPr anchor="ctr">
+                    <a:lnL w="12700" cap="flat" cmpd="sng" algn="ctr">
+                      <a:solidFill>
+                        <a:schemeClr val="tx1"/>
+                      </a:solidFill>
+                      <a:prstDash val="solid"/>
+                      <a:round/>
+                      <a:headEnd type="none" w="med" len="med"/>
+                      <a:tailEnd type="none" w="med" len="med"/>
+                    </a:lnL>
+                    <a:lnR w="12700" cap="flat" cmpd="sng" algn="ctr">
+                      <a:solidFill>
+                        <a:schemeClr val="tx1"/>
+                      </a:solidFill>
+                      <a:prstDash val="solid"/>
+                      <a:round/>
+                      <a:headEnd type="none" w="med" len="med"/>
+                      <a:tailEnd type="none" w="med" len="med"/>
+                    </a:lnR>
+                    <a:lnT w="12700" cap="flat" cmpd="sng" algn="ctr">
+                      <a:solidFill>
+                        <a:schemeClr val="tx1"/>
+                      </a:solidFill>
+                      <a:prstDash val="solid"/>
+                      <a:round/>
+                      <a:headEnd type="none" w="med" len="med"/>
+                      <a:tailEnd type="none" w="med" len="med"/>
+                    </a:lnT>
+                    <a:lnB w="12700" cap="flat" cmpd="sng" algn="ctr">
+                      <a:solidFill>
+                        <a:schemeClr val="tx1"/>
+                      </a:solidFill>
+                      <a:prstDash val="solid"/>
+                      <a:round/>
+                      <a:headEnd type="none" w="med" len="med"/>
+                      <a:tailEnd type="none" w="med" len="med"/>
+                    </a:lnB>
+                    <a:solidFill>
+                      <a:srgbClr val="779556"/>
+                    </a:solidFill>
+                  </a:tcPr>
+                </a:tc>
+                <a:tc>
+                  <a:txBody>
+                    <a:bodyPr/>
+                    <a:lstStyle/>
+                    <a:p>
+                      <a:pPr algn="ctr"/>
+                      <a:endParaRPr lang="it-IT" sz="3600" b="0" dirty="0">
+                        <a:solidFill>
+                          <a:schemeClr val="tx1"/>
+                        </a:solidFill>
+                      </a:endParaRPr>
+                    </a:p>
+                  </a:txBody>
+                  <a:tcPr anchor="ctr">
+                    <a:lnL w="12700" cap="flat" cmpd="sng" algn="ctr">
+                      <a:solidFill>
+                        <a:schemeClr val="tx1"/>
+                      </a:solidFill>
+                      <a:prstDash val="solid"/>
+                      <a:round/>
+                      <a:headEnd type="none" w="med" len="med"/>
+                      <a:tailEnd type="none" w="med" len="med"/>
+                    </a:lnL>
+                    <a:lnR w="12700" cap="flat" cmpd="sng" algn="ctr">
+                      <a:solidFill>
+                        <a:schemeClr val="tx1"/>
+                      </a:solidFill>
+                      <a:prstDash val="solid"/>
+                      <a:round/>
+                      <a:headEnd type="none" w="med" len="med"/>
+                      <a:tailEnd type="none" w="med" len="med"/>
+                    </a:lnR>
+                    <a:lnT w="12700" cap="flat" cmpd="sng" algn="ctr">
+                      <a:solidFill>
+                        <a:schemeClr val="tx1"/>
+                      </a:solidFill>
+                      <a:prstDash val="solid"/>
+                      <a:round/>
+                      <a:headEnd type="none" w="med" len="med"/>
+                      <a:tailEnd type="none" w="med" len="med"/>
+                    </a:lnT>
+                    <a:lnB w="12700" cap="flat" cmpd="sng" algn="ctr">
+                      <a:solidFill>
+                        <a:schemeClr val="tx1"/>
+                      </a:solidFill>
+                      <a:prstDash val="solid"/>
+                      <a:round/>
+                      <a:headEnd type="none" w="med" len="med"/>
+                      <a:tailEnd type="none" w="med" len="med"/>
+                    </a:lnB>
+                    <a:solidFill>
+                      <a:srgbClr val="EBECD0"/>
+                    </a:solidFill>
+                  </a:tcPr>
+                </a:tc>
+                <a:extLst>
+                  <a:ext uri="{0D108BD9-81ED-4DB2-BD59-A6C34878D82A}">
+                    <a16:rowId xmlns:a16="http://schemas.microsoft.com/office/drawing/2014/main" val="3110994893"/>
+                  </a:ext>
+                </a:extLst>
+              </a:tr>
+              <a:tr h="792278">
+                <a:tc>
+                  <a:txBody>
+                    <a:bodyPr/>
+                    <a:lstStyle/>
+                    <a:p>
+                      <a:pPr algn="ctr"/>
+                      <a:endParaRPr lang="it-IT" sz="3600" b="0" dirty="0">
+                        <a:solidFill>
+                          <a:schemeClr val="tx1"/>
+                        </a:solidFill>
+                      </a:endParaRPr>
+                    </a:p>
+                  </a:txBody>
+                  <a:tcPr anchor="ctr">
+                    <a:lnL w="12700" cap="flat" cmpd="sng" algn="ctr">
+                      <a:solidFill>
+                        <a:schemeClr val="tx1"/>
+                      </a:solidFill>
+                      <a:prstDash val="solid"/>
+                      <a:round/>
+                      <a:headEnd type="none" w="med" len="med"/>
+                      <a:tailEnd type="none" w="med" len="med"/>
+                    </a:lnL>
+                    <a:lnR w="12700" cap="flat" cmpd="sng" algn="ctr">
+                      <a:solidFill>
+                        <a:schemeClr val="tx1"/>
+                      </a:solidFill>
+                      <a:prstDash val="solid"/>
+                      <a:round/>
+                      <a:headEnd type="none" w="med" len="med"/>
+                      <a:tailEnd type="none" w="med" len="med"/>
+                    </a:lnR>
+                    <a:lnT w="12700" cap="flat" cmpd="sng" algn="ctr">
+                      <a:solidFill>
+                        <a:schemeClr val="tx1"/>
+                      </a:solidFill>
+                      <a:prstDash val="solid"/>
+                      <a:round/>
+                      <a:headEnd type="none" w="med" len="med"/>
+                      <a:tailEnd type="none" w="med" len="med"/>
+                    </a:lnT>
+                    <a:lnB w="12700" cap="flat" cmpd="sng" algn="ctr">
+                      <a:solidFill>
+                        <a:schemeClr val="tx1"/>
+                      </a:solidFill>
+                      <a:prstDash val="solid"/>
+                      <a:round/>
+                      <a:headEnd type="none" w="med" len="med"/>
+                      <a:tailEnd type="none" w="med" len="med"/>
+                    </a:lnB>
+                    <a:solidFill>
+                      <a:srgbClr val="779556"/>
+                    </a:solidFill>
+                  </a:tcPr>
+                </a:tc>
+                <a:tc>
+                  <a:txBody>
+                    <a:bodyPr/>
+                    <a:lstStyle/>
+                    <a:p>
+                      <a:pPr algn="ctr"/>
+                      <a:r>
+                        <a:rPr lang="it-IT" sz="3600" b="0" dirty="0">
+                          <a:solidFill>
+                            <a:schemeClr val="tx1"/>
+                          </a:solidFill>
+                        </a:rPr>
+                        <a:t>5</a:t>
+                      </a:r>
+                    </a:p>
+                  </a:txBody>
+                  <a:tcPr anchor="ctr">
+                    <a:lnL w="12700" cap="flat" cmpd="sng" algn="ctr">
+                      <a:solidFill>
+                        <a:schemeClr val="tx1"/>
+                      </a:solidFill>
+                      <a:prstDash val="solid"/>
+                      <a:round/>
+                      <a:headEnd type="none" w="med" len="med"/>
+                      <a:tailEnd type="none" w="med" len="med"/>
+                    </a:lnL>
+                    <a:lnR w="12700" cap="flat" cmpd="sng" algn="ctr">
+                      <a:solidFill>
+                        <a:schemeClr val="tx1"/>
+                      </a:solidFill>
+                      <a:prstDash val="solid"/>
+                      <a:round/>
+                      <a:headEnd type="none" w="med" len="med"/>
+                      <a:tailEnd type="none" w="med" len="med"/>
+                    </a:lnR>
+                    <a:lnT w="12700" cap="flat" cmpd="sng" algn="ctr">
+                      <a:solidFill>
+                        <a:schemeClr val="tx1"/>
+                      </a:solidFill>
+                      <a:prstDash val="solid"/>
+                      <a:round/>
+                      <a:headEnd type="none" w="med" len="med"/>
+                      <a:tailEnd type="none" w="med" len="med"/>
+                    </a:lnT>
+                    <a:lnB w="12700" cap="flat" cmpd="sng" algn="ctr">
+                      <a:solidFill>
+                        <a:schemeClr val="tx1"/>
+                      </a:solidFill>
+                      <a:prstDash val="solid"/>
+                      <a:round/>
+                      <a:headEnd type="none" w="med" len="med"/>
+                      <a:tailEnd type="none" w="med" len="med"/>
+                    </a:lnB>
+                    <a:solidFill>
+                      <a:srgbClr val="EBECD0"/>
+                    </a:solidFill>
+                  </a:tcPr>
+                </a:tc>
+                <a:tc>
+                  <a:txBody>
+                    <a:bodyPr/>
+                    <a:lstStyle/>
+                    <a:p>
+                      <a:pPr algn="ctr"/>
+                      <a:endParaRPr lang="it-IT" sz="3600" b="0" dirty="0">
+                        <a:solidFill>
+                          <a:schemeClr val="tx1"/>
+                        </a:solidFill>
+                      </a:endParaRPr>
+                    </a:p>
+                  </a:txBody>
+                  <a:tcPr anchor="ctr">
+                    <a:lnL w="12700" cap="flat" cmpd="sng" algn="ctr">
+                      <a:solidFill>
+                        <a:schemeClr val="tx1"/>
+                      </a:solidFill>
+                      <a:prstDash val="solid"/>
+                      <a:round/>
+                      <a:headEnd type="none" w="med" len="med"/>
+                      <a:tailEnd type="none" w="med" len="med"/>
+                    </a:lnL>
+                    <a:lnR w="12700" cap="flat" cmpd="sng" algn="ctr">
+                      <a:solidFill>
+                        <a:schemeClr val="tx1"/>
+                      </a:solidFill>
+                      <a:prstDash val="solid"/>
+                      <a:round/>
+                      <a:headEnd type="none" w="med" len="med"/>
+                      <a:tailEnd type="none" w="med" len="med"/>
+                    </a:lnR>
+                    <a:lnT w="12700" cap="flat" cmpd="sng" algn="ctr">
+                      <a:solidFill>
+                        <a:schemeClr val="tx1"/>
+                      </a:solidFill>
+                      <a:prstDash val="solid"/>
+                      <a:round/>
+                      <a:headEnd type="none" w="med" len="med"/>
+                      <a:tailEnd type="none" w="med" len="med"/>
+                    </a:lnT>
+                    <a:lnB w="12700" cap="flat" cmpd="sng" algn="ctr">
+                      <a:solidFill>
+                        <a:schemeClr val="tx1"/>
+                      </a:solidFill>
+                      <a:prstDash val="solid"/>
+                      <a:round/>
+                      <a:headEnd type="none" w="med" len="med"/>
+                      <a:tailEnd type="none" w="med" len="med"/>
+                    </a:lnB>
+                    <a:solidFill>
+                      <a:srgbClr val="779556"/>
+                    </a:solidFill>
+                  </a:tcPr>
+                </a:tc>
+                <a:tc>
+                  <a:txBody>
+                    <a:bodyPr/>
+                    <a:lstStyle/>
+                    <a:p>
+                      <a:pPr algn="ctr"/>
+                      <a:endParaRPr lang="it-IT" sz="3600" b="0" dirty="0">
+                        <a:solidFill>
+                          <a:schemeClr val="tx1"/>
+                        </a:solidFill>
+                      </a:endParaRPr>
+                    </a:p>
+                  </a:txBody>
+                  <a:tcPr anchor="ctr">
+                    <a:lnL w="12700" cap="flat" cmpd="sng" algn="ctr">
+                      <a:solidFill>
+                        <a:schemeClr val="tx1"/>
+                      </a:solidFill>
+                      <a:prstDash val="solid"/>
+                      <a:round/>
+                      <a:headEnd type="none" w="med" len="med"/>
+                      <a:tailEnd type="none" w="med" len="med"/>
+                    </a:lnL>
+                    <a:lnR w="12700" cap="flat" cmpd="sng" algn="ctr">
+                      <a:solidFill>
+                        <a:schemeClr val="tx1"/>
+                      </a:solidFill>
+                      <a:prstDash val="solid"/>
+                      <a:round/>
+                      <a:headEnd type="none" w="med" len="med"/>
+                      <a:tailEnd type="none" w="med" len="med"/>
+                    </a:lnR>
+                    <a:lnT w="12700" cap="flat" cmpd="sng" algn="ctr">
+                      <a:solidFill>
+                        <a:schemeClr val="tx1"/>
+                      </a:solidFill>
+                      <a:prstDash val="solid"/>
+                      <a:round/>
+                      <a:headEnd type="none" w="med" len="med"/>
+                      <a:tailEnd type="none" w="med" len="med"/>
+                    </a:lnT>
+                    <a:lnB w="12700" cap="flat" cmpd="sng" algn="ctr">
+                      <a:solidFill>
+                        <a:schemeClr val="tx1"/>
+                      </a:solidFill>
+                      <a:prstDash val="solid"/>
+                      <a:round/>
+                      <a:headEnd type="none" w="med" len="med"/>
+                      <a:tailEnd type="none" w="med" len="med"/>
+                    </a:lnB>
+                    <a:solidFill>
+                      <a:srgbClr val="EBECD0"/>
+                    </a:solidFill>
+                  </a:tcPr>
+                </a:tc>
+                <a:tc>
+                  <a:txBody>
+                    <a:bodyPr/>
+                    <a:lstStyle/>
+                    <a:p>
+                      <a:pPr algn="ctr"/>
+                      <a:endParaRPr lang="it-IT" sz="3600" b="0" dirty="0">
+                        <a:solidFill>
+                          <a:schemeClr val="tx1"/>
+                        </a:solidFill>
+                      </a:endParaRPr>
+                    </a:p>
+                  </a:txBody>
+                  <a:tcPr anchor="ctr">
+                    <a:lnL w="12700" cap="flat" cmpd="sng" algn="ctr">
+                      <a:solidFill>
+                        <a:schemeClr val="tx1"/>
+                      </a:solidFill>
+                      <a:prstDash val="solid"/>
+                      <a:round/>
+                      <a:headEnd type="none" w="med" len="med"/>
+                      <a:tailEnd type="none" w="med" len="med"/>
+                    </a:lnL>
+                    <a:lnR w="12700" cap="flat" cmpd="sng" algn="ctr">
+                      <a:solidFill>
+                        <a:schemeClr val="tx1"/>
+                      </a:solidFill>
+                      <a:prstDash val="solid"/>
+                      <a:round/>
+                      <a:headEnd type="none" w="med" len="med"/>
+                      <a:tailEnd type="none" w="med" len="med"/>
+                    </a:lnR>
+                    <a:lnT w="12700" cap="flat" cmpd="sng" algn="ctr">
+                      <a:solidFill>
+                        <a:schemeClr val="tx1"/>
+                      </a:solidFill>
+                      <a:prstDash val="solid"/>
+                      <a:round/>
+                      <a:headEnd type="none" w="med" len="med"/>
+                      <a:tailEnd type="none" w="med" len="med"/>
+                    </a:lnT>
+                    <a:lnB w="12700" cap="flat" cmpd="sng" algn="ctr">
+                      <a:solidFill>
+                        <a:schemeClr val="tx1"/>
+                      </a:solidFill>
+                      <a:prstDash val="solid"/>
+                      <a:round/>
+                      <a:headEnd type="none" w="med" len="med"/>
+                      <a:tailEnd type="none" w="med" len="med"/>
+                    </a:lnB>
+                    <a:solidFill>
+                      <a:srgbClr val="779556"/>
+                    </a:solidFill>
+                  </a:tcPr>
+                </a:tc>
+                <a:extLst>
+                  <a:ext uri="{0D108BD9-81ED-4DB2-BD59-A6C34878D82A}">
+                    <a16:rowId xmlns:a16="http://schemas.microsoft.com/office/drawing/2014/main" val="2947644635"/>
+                  </a:ext>
+                </a:extLst>
+              </a:tr>
+              <a:tr h="792278">
+                <a:tc>
+                  <a:txBody>
+                    <a:bodyPr/>
+                    <a:lstStyle/>
+                    <a:p>
+                      <a:pPr algn="ctr"/>
+                      <a:endParaRPr lang="it-IT" sz="3600" b="0" dirty="0">
+                        <a:solidFill>
+                          <a:schemeClr val="tx1"/>
+                        </a:solidFill>
+                      </a:endParaRPr>
+                    </a:p>
+                  </a:txBody>
+                  <a:tcPr anchor="ctr">
+                    <a:lnL w="12700" cap="flat" cmpd="sng" algn="ctr">
+                      <a:solidFill>
+                        <a:schemeClr val="tx1"/>
+                      </a:solidFill>
+                      <a:prstDash val="solid"/>
+                      <a:round/>
+                      <a:headEnd type="none" w="med" len="med"/>
+                      <a:tailEnd type="none" w="med" len="med"/>
+                    </a:lnL>
+                    <a:lnR w="12700" cap="flat" cmpd="sng" algn="ctr">
+                      <a:solidFill>
+                        <a:schemeClr val="tx1"/>
+                      </a:solidFill>
+                      <a:prstDash val="solid"/>
+                      <a:round/>
+                      <a:headEnd type="none" w="med" len="med"/>
+                      <a:tailEnd type="none" w="med" len="med"/>
+                    </a:lnR>
+                    <a:lnT w="12700" cap="flat" cmpd="sng" algn="ctr">
+                      <a:solidFill>
+                        <a:schemeClr val="tx1"/>
+                      </a:solidFill>
+                      <a:prstDash val="solid"/>
+                      <a:round/>
+                      <a:headEnd type="none" w="med" len="med"/>
+                      <a:tailEnd type="none" w="med" len="med"/>
+                    </a:lnT>
+                    <a:lnB w="12700" cap="flat" cmpd="sng" algn="ctr">
+                      <a:solidFill>
+                        <a:schemeClr val="tx1"/>
+                      </a:solidFill>
+                      <a:prstDash val="solid"/>
+                      <a:round/>
+                      <a:headEnd type="none" w="med" len="med"/>
+                      <a:tailEnd type="none" w="med" len="med"/>
+                    </a:lnB>
+                    <a:solidFill>
+                      <a:srgbClr val="EBECD0"/>
+                    </a:solidFill>
+                  </a:tcPr>
+                </a:tc>
+                <a:tc>
+                  <a:txBody>
+                    <a:bodyPr/>
+                    <a:lstStyle/>
+                    <a:p>
+                      <a:pPr algn="ctr"/>
+                      <a:endParaRPr lang="it-IT" sz="3600" b="0" dirty="0">
+                        <a:solidFill>
+                          <a:schemeClr val="tx1"/>
+                        </a:solidFill>
+                      </a:endParaRPr>
+                    </a:p>
+                  </a:txBody>
+                  <a:tcPr anchor="ctr">
+                    <a:lnL w="12700" cap="flat" cmpd="sng" algn="ctr">
+                      <a:solidFill>
+                        <a:schemeClr val="tx1"/>
+                      </a:solidFill>
+                      <a:prstDash val="solid"/>
+                      <a:round/>
+                      <a:headEnd type="none" w="med" len="med"/>
+                      <a:tailEnd type="none" w="med" len="med"/>
+                    </a:lnL>
+                    <a:lnR w="12700" cap="flat" cmpd="sng" algn="ctr">
+                      <a:solidFill>
+                        <a:schemeClr val="tx1"/>
+                      </a:solidFill>
+                      <a:prstDash val="solid"/>
+                      <a:round/>
+                      <a:headEnd type="none" w="med" len="med"/>
+                      <a:tailEnd type="none" w="med" len="med"/>
+                    </a:lnR>
+                    <a:lnT w="12700" cap="flat" cmpd="sng" algn="ctr">
+                      <a:solidFill>
+                        <a:schemeClr val="tx1"/>
+                      </a:solidFill>
+                      <a:prstDash val="solid"/>
+                      <a:round/>
+                      <a:headEnd type="none" w="med" len="med"/>
+                      <a:tailEnd type="none" w="med" len="med"/>
+                    </a:lnT>
+                    <a:lnB w="12700" cap="flat" cmpd="sng" algn="ctr">
+                      <a:solidFill>
+                        <a:schemeClr val="tx1"/>
+                      </a:solidFill>
+                      <a:prstDash val="solid"/>
+                      <a:round/>
+                      <a:headEnd type="none" w="med" len="med"/>
+                      <a:tailEnd type="none" w="med" len="med"/>
+                    </a:lnB>
+                    <a:solidFill>
+                      <a:srgbClr val="779556"/>
+                    </a:solidFill>
+                  </a:tcPr>
+                </a:tc>
+                <a:tc>
+                  <a:txBody>
+                    <a:bodyPr/>
+                    <a:lstStyle/>
+                    <a:p>
+                      <a:pPr algn="ctr"/>
+                      <a:r>
+                        <a:rPr lang="it-IT" sz="3600" b="0" dirty="0">
+                          <a:solidFill>
+                            <a:schemeClr val="tx1"/>
+                          </a:solidFill>
+                        </a:rPr>
+                        <a:t>5</a:t>
+                      </a:r>
+                    </a:p>
+                  </a:txBody>
+                  <a:tcPr anchor="ctr">
+                    <a:lnL w="12700" cap="flat" cmpd="sng" algn="ctr">
+                      <a:solidFill>
+                        <a:schemeClr val="tx1"/>
+                      </a:solidFill>
+                      <a:prstDash val="solid"/>
+                      <a:round/>
+                      <a:headEnd type="none" w="med" len="med"/>
+                      <a:tailEnd type="none" w="med" len="med"/>
+                    </a:lnL>
+                    <a:lnR w="12700" cap="flat" cmpd="sng" algn="ctr">
+                      <a:solidFill>
+                        <a:schemeClr val="tx1"/>
+                      </a:solidFill>
+                      <a:prstDash val="solid"/>
+                      <a:round/>
+                      <a:headEnd type="none" w="med" len="med"/>
+                      <a:tailEnd type="none" w="med" len="med"/>
+                    </a:lnR>
+                    <a:lnT w="12700" cap="flat" cmpd="sng" algn="ctr">
+                      <a:solidFill>
+                        <a:schemeClr val="tx1"/>
+                      </a:solidFill>
+                      <a:prstDash val="solid"/>
+                      <a:round/>
+                      <a:headEnd type="none" w="med" len="med"/>
+                      <a:tailEnd type="none" w="med" len="med"/>
+                    </a:lnT>
+                    <a:lnB w="12700" cap="flat" cmpd="sng" algn="ctr">
+                      <a:solidFill>
+                        <a:schemeClr val="tx1"/>
+                      </a:solidFill>
+                      <a:prstDash val="solid"/>
+                      <a:round/>
+                      <a:headEnd type="none" w="med" len="med"/>
+                      <a:tailEnd type="none" w="med" len="med"/>
+                    </a:lnB>
+                    <a:solidFill>
+                      <a:srgbClr val="EBECD0"/>
+                    </a:solidFill>
+                  </a:tcPr>
+                </a:tc>
+                <a:tc>
+                  <a:txBody>
+                    <a:bodyPr/>
+                    <a:lstStyle/>
+                    <a:p>
+                      <a:pPr algn="ctr"/>
+                      <a:endParaRPr lang="it-IT" sz="3600" b="0" dirty="0">
+                        <a:solidFill>
+                          <a:schemeClr val="tx1"/>
+                        </a:solidFill>
+                      </a:endParaRPr>
+                    </a:p>
+                  </a:txBody>
+                  <a:tcPr anchor="ctr">
+                    <a:lnL w="12700" cap="flat" cmpd="sng" algn="ctr">
+                      <a:solidFill>
+                        <a:schemeClr val="tx1"/>
+                      </a:solidFill>
+                      <a:prstDash val="solid"/>
+                      <a:round/>
+                      <a:headEnd type="none" w="med" len="med"/>
+                      <a:tailEnd type="none" w="med" len="med"/>
+                    </a:lnL>
+                    <a:lnR w="12700" cap="flat" cmpd="sng" algn="ctr">
+                      <a:solidFill>
+                        <a:schemeClr val="tx1"/>
+                      </a:solidFill>
+                      <a:prstDash val="solid"/>
+                      <a:round/>
+                      <a:headEnd type="none" w="med" len="med"/>
+                      <a:tailEnd type="none" w="med" len="med"/>
+                    </a:lnR>
+                    <a:lnT w="12700" cap="flat" cmpd="sng" algn="ctr">
+                      <a:solidFill>
+                        <a:schemeClr val="tx1"/>
+                      </a:solidFill>
+                      <a:prstDash val="solid"/>
+                      <a:round/>
+                      <a:headEnd type="none" w="med" len="med"/>
+                      <a:tailEnd type="none" w="med" len="med"/>
+                    </a:lnT>
+                    <a:lnB w="12700" cap="flat" cmpd="sng" algn="ctr">
+                      <a:solidFill>
+                        <a:schemeClr val="tx1"/>
+                      </a:solidFill>
+                      <a:prstDash val="solid"/>
+                      <a:round/>
+                      <a:headEnd type="none" w="med" len="med"/>
+                      <a:tailEnd type="none" w="med" len="med"/>
+                    </a:lnB>
+                    <a:solidFill>
+                      <a:srgbClr val="779556"/>
+                    </a:solidFill>
+                  </a:tcPr>
+                </a:tc>
+                <a:tc>
+                  <a:txBody>
+                    <a:bodyPr/>
+                    <a:lstStyle/>
+                    <a:p>
+                      <a:pPr algn="ctr"/>
+                      <a:r>
+                        <a:rPr lang="it-IT" sz="3600" b="0" dirty="0">
+                          <a:solidFill>
+                            <a:schemeClr val="tx1"/>
+                          </a:solidFill>
+                        </a:rPr>
+                        <a:t>2</a:t>
+                      </a:r>
+                    </a:p>
+                  </a:txBody>
+                  <a:tcPr anchor="ctr">
+                    <a:lnL w="12700" cap="flat" cmpd="sng" algn="ctr">
+                      <a:solidFill>
+                        <a:schemeClr val="tx1"/>
+                      </a:solidFill>
+                      <a:prstDash val="solid"/>
+                      <a:round/>
+                      <a:headEnd type="none" w="med" len="med"/>
+                      <a:tailEnd type="none" w="med" len="med"/>
+                    </a:lnL>
+                    <a:lnR w="12700" cap="flat" cmpd="sng" algn="ctr">
+                      <a:solidFill>
+                        <a:schemeClr val="tx1"/>
+                      </a:solidFill>
+                      <a:prstDash val="solid"/>
+                      <a:round/>
+                      <a:headEnd type="none" w="med" len="med"/>
+                      <a:tailEnd type="none" w="med" len="med"/>
+                    </a:lnR>
+                    <a:lnT w="12700" cap="flat" cmpd="sng" algn="ctr">
+                      <a:solidFill>
+                        <a:schemeClr val="tx1"/>
+                      </a:solidFill>
+                      <a:prstDash val="solid"/>
+                      <a:round/>
+                      <a:headEnd type="none" w="med" len="med"/>
+                      <a:tailEnd type="none" w="med" len="med"/>
+                    </a:lnT>
+                    <a:lnB w="12700" cap="flat" cmpd="sng" algn="ctr">
+                      <a:solidFill>
+                        <a:schemeClr val="tx1"/>
+                      </a:solidFill>
+                      <a:prstDash val="solid"/>
+                      <a:round/>
+                      <a:headEnd type="none" w="med" len="med"/>
+                      <a:tailEnd type="none" w="med" len="med"/>
+                    </a:lnB>
+                    <a:solidFill>
+                      <a:srgbClr val="EBECD0"/>
+                    </a:solidFill>
+                  </a:tcPr>
+                </a:tc>
+                <a:extLst>
+                  <a:ext uri="{0D108BD9-81ED-4DB2-BD59-A6C34878D82A}">
+                    <a16:rowId xmlns:a16="http://schemas.microsoft.com/office/drawing/2014/main" val="2001180820"/>
+                  </a:ext>
+                </a:extLst>
+              </a:tr>
+              <a:tr h="792278">
+                <a:tc>
+                  <a:txBody>
+                    <a:bodyPr/>
+                    <a:lstStyle/>
+                    <a:p>
+                      <a:pPr algn="ctr"/>
+                      <a:endParaRPr lang="it-IT" sz="3600" b="0" dirty="0">
+                        <a:solidFill>
+                          <a:schemeClr val="tx1"/>
+                        </a:solidFill>
+                      </a:endParaRPr>
+                    </a:p>
+                  </a:txBody>
+                  <a:tcPr anchor="ctr">
+                    <a:lnL w="12700" cap="flat" cmpd="sng" algn="ctr">
+                      <a:solidFill>
+                        <a:schemeClr val="tx1"/>
+                      </a:solidFill>
+                      <a:prstDash val="solid"/>
+                      <a:round/>
+                      <a:headEnd type="none" w="med" len="med"/>
+                      <a:tailEnd type="none" w="med" len="med"/>
+                    </a:lnL>
+                    <a:lnR w="12700" cap="flat" cmpd="sng" algn="ctr">
+                      <a:solidFill>
+                        <a:schemeClr val="tx1"/>
+                      </a:solidFill>
+                      <a:prstDash val="solid"/>
+                      <a:round/>
+                      <a:headEnd type="none" w="med" len="med"/>
+                      <a:tailEnd type="none" w="med" len="med"/>
+                    </a:lnR>
+                    <a:lnT w="12700" cap="flat" cmpd="sng" algn="ctr">
+                      <a:solidFill>
+                        <a:schemeClr val="tx1"/>
+                      </a:solidFill>
+                      <a:prstDash val="solid"/>
+                      <a:round/>
+                      <a:headEnd type="none" w="med" len="med"/>
+                      <a:tailEnd type="none" w="med" len="med"/>
+                    </a:lnT>
+                    <a:lnB w="12700" cap="flat" cmpd="sng" algn="ctr">
+                      <a:solidFill>
+                        <a:schemeClr val="tx1"/>
+                      </a:solidFill>
+                      <a:prstDash val="solid"/>
+                      <a:round/>
+                      <a:headEnd type="none" w="med" len="med"/>
+                      <a:tailEnd type="none" w="med" len="med"/>
+                    </a:lnB>
+                    <a:solidFill>
+                      <a:srgbClr val="779556"/>
+                    </a:solidFill>
+                  </a:tcPr>
+                </a:tc>
+                <a:tc>
+                  <a:txBody>
+                    <a:bodyPr/>
+                    <a:lstStyle/>
+                    <a:p>
+                      <a:pPr algn="ctr"/>
+                      <a:endParaRPr lang="it-IT" sz="3600" b="0" dirty="0">
+                        <a:solidFill>
+                          <a:schemeClr val="tx1"/>
+                        </a:solidFill>
+                      </a:endParaRPr>
+                    </a:p>
+                  </a:txBody>
+                  <a:tcPr anchor="ctr">
+                    <a:lnL w="12700" cap="flat" cmpd="sng" algn="ctr">
+                      <a:solidFill>
+                        <a:schemeClr val="tx1"/>
+                      </a:solidFill>
+                      <a:prstDash val="solid"/>
+                      <a:round/>
+                      <a:headEnd type="none" w="med" len="med"/>
+                      <a:tailEnd type="none" w="med" len="med"/>
+                    </a:lnL>
+                    <a:lnR w="12700" cap="flat" cmpd="sng" algn="ctr">
+                      <a:solidFill>
+                        <a:schemeClr val="tx1"/>
+                      </a:solidFill>
+                      <a:prstDash val="solid"/>
+                      <a:round/>
+                      <a:headEnd type="none" w="med" len="med"/>
+                      <a:tailEnd type="none" w="med" len="med"/>
+                    </a:lnR>
+                    <a:lnT w="12700" cap="flat" cmpd="sng" algn="ctr">
+                      <a:solidFill>
+                        <a:schemeClr val="tx1"/>
+                      </a:solidFill>
+                      <a:prstDash val="solid"/>
+                      <a:round/>
+                      <a:headEnd type="none" w="med" len="med"/>
+                      <a:tailEnd type="none" w="med" len="med"/>
+                    </a:lnT>
+                    <a:lnB w="12700" cap="flat" cmpd="sng" algn="ctr">
+                      <a:solidFill>
+                        <a:schemeClr val="tx1"/>
+                      </a:solidFill>
+                      <a:prstDash val="solid"/>
+                      <a:round/>
+                      <a:headEnd type="none" w="med" len="med"/>
+                      <a:tailEnd type="none" w="med" len="med"/>
+                    </a:lnB>
+                    <a:solidFill>
+                      <a:srgbClr val="EBECD0"/>
+                    </a:solidFill>
+                  </a:tcPr>
+                </a:tc>
+                <a:tc>
+                  <a:txBody>
+                    <a:bodyPr/>
+                    <a:lstStyle/>
+                    <a:p>
+                      <a:pPr algn="ctr"/>
+                      <a:endParaRPr lang="it-IT" sz="3600" b="0" dirty="0">
+                        <a:solidFill>
+                          <a:schemeClr val="tx1"/>
+                        </a:solidFill>
+                      </a:endParaRPr>
+                    </a:p>
+                  </a:txBody>
+                  <a:tcPr anchor="ctr">
+                    <a:lnL w="12700" cap="flat" cmpd="sng" algn="ctr">
+                      <a:solidFill>
+                        <a:schemeClr val="tx1"/>
+                      </a:solidFill>
+                      <a:prstDash val="solid"/>
+                      <a:round/>
+                      <a:headEnd type="none" w="med" len="med"/>
+                      <a:tailEnd type="none" w="med" len="med"/>
+                    </a:lnL>
+                    <a:lnR w="12700" cap="flat" cmpd="sng" algn="ctr">
+                      <a:solidFill>
+                        <a:schemeClr val="tx1"/>
+                      </a:solidFill>
+                      <a:prstDash val="solid"/>
+                      <a:round/>
+                      <a:headEnd type="none" w="med" len="med"/>
+                      <a:tailEnd type="none" w="med" len="med"/>
+                    </a:lnR>
+                    <a:lnT w="12700" cap="flat" cmpd="sng" algn="ctr">
+                      <a:solidFill>
+                        <a:schemeClr val="tx1"/>
+                      </a:solidFill>
+                      <a:prstDash val="solid"/>
+                      <a:round/>
+                      <a:headEnd type="none" w="med" len="med"/>
+                      <a:tailEnd type="none" w="med" len="med"/>
+                    </a:lnT>
+                    <a:lnB w="12700" cap="flat" cmpd="sng" algn="ctr">
+                      <a:solidFill>
+                        <a:schemeClr val="tx1"/>
+                      </a:solidFill>
+                      <a:prstDash val="solid"/>
+                      <a:round/>
+                      <a:headEnd type="none" w="med" len="med"/>
+                      <a:tailEnd type="none" w="med" len="med"/>
+                    </a:lnB>
+                    <a:solidFill>
+                      <a:srgbClr val="779556"/>
+                    </a:solidFill>
+                  </a:tcPr>
+                </a:tc>
+                <a:tc>
+                  <a:txBody>
+                    <a:bodyPr/>
+                    <a:lstStyle/>
+                    <a:p>
+                      <a:pPr algn="ctr"/>
+                      <a:endParaRPr lang="it-IT" sz="3600" b="0" dirty="0">
+                        <a:solidFill>
+                          <a:schemeClr val="tx1"/>
+                        </a:solidFill>
+                      </a:endParaRPr>
+                    </a:p>
+                  </a:txBody>
+                  <a:tcPr anchor="ctr">
+                    <a:lnL w="12700" cap="flat" cmpd="sng" algn="ctr">
+                      <a:solidFill>
+                        <a:schemeClr val="tx1"/>
+                      </a:solidFill>
+                      <a:prstDash val="solid"/>
+                      <a:round/>
+                      <a:headEnd type="none" w="med" len="med"/>
+                      <a:tailEnd type="none" w="med" len="med"/>
+                    </a:lnL>
+                    <a:lnR w="12700" cap="flat" cmpd="sng" algn="ctr">
+                      <a:solidFill>
+                        <a:schemeClr val="tx1"/>
+                      </a:solidFill>
+                      <a:prstDash val="solid"/>
+                      <a:round/>
+                      <a:headEnd type="none" w="med" len="med"/>
+                      <a:tailEnd type="none" w="med" len="med"/>
+                    </a:lnR>
+                    <a:lnT w="12700" cap="flat" cmpd="sng" algn="ctr">
+                      <a:solidFill>
+                        <a:schemeClr val="tx1"/>
+                      </a:solidFill>
+                      <a:prstDash val="solid"/>
+                      <a:round/>
+                      <a:headEnd type="none" w="med" len="med"/>
+                      <a:tailEnd type="none" w="med" len="med"/>
+                    </a:lnT>
+                    <a:lnB w="12700" cap="flat" cmpd="sng" algn="ctr">
+                      <a:solidFill>
+                        <a:schemeClr val="tx1"/>
+                      </a:solidFill>
+                      <a:prstDash val="solid"/>
+                      <a:round/>
+                      <a:headEnd type="none" w="med" len="med"/>
+                      <a:tailEnd type="none" w="med" len="med"/>
+                    </a:lnB>
+                    <a:solidFill>
+                      <a:srgbClr val="EBECD0"/>
+                    </a:solidFill>
+                  </a:tcPr>
+                </a:tc>
+                <a:tc>
+                  <a:txBody>
+                    <a:bodyPr/>
+                    <a:lstStyle/>
+                    <a:p>
+                      <a:pPr algn="ctr"/>
+                      <a:endParaRPr lang="it-IT" sz="3600" b="0" dirty="0">
+                        <a:solidFill>
+                          <a:schemeClr val="tx1"/>
+                        </a:solidFill>
+                      </a:endParaRPr>
+                    </a:p>
+                  </a:txBody>
+                  <a:tcPr anchor="ctr">
+                    <a:lnL w="12700" cap="flat" cmpd="sng" algn="ctr">
+                      <a:solidFill>
+                        <a:schemeClr val="tx1"/>
+                      </a:solidFill>
+                      <a:prstDash val="solid"/>
+                      <a:round/>
+                      <a:headEnd type="none" w="med" len="med"/>
+                      <a:tailEnd type="none" w="med" len="med"/>
+                    </a:lnL>
+                    <a:lnR w="12700" cap="flat" cmpd="sng" algn="ctr">
+                      <a:solidFill>
+                        <a:schemeClr val="tx1"/>
+                      </a:solidFill>
+                      <a:prstDash val="solid"/>
+                      <a:round/>
+                      <a:headEnd type="none" w="med" len="med"/>
+                      <a:tailEnd type="none" w="med" len="med"/>
+                    </a:lnR>
+                    <a:lnT w="12700" cap="flat" cmpd="sng" algn="ctr">
+                      <a:solidFill>
+                        <a:schemeClr val="tx1"/>
+                      </a:solidFill>
+                      <a:prstDash val="solid"/>
+                      <a:round/>
+                      <a:headEnd type="none" w="med" len="med"/>
+                      <a:tailEnd type="none" w="med" len="med"/>
+                    </a:lnT>
+                    <a:lnB w="12700" cap="flat" cmpd="sng" algn="ctr">
+                      <a:solidFill>
+                        <a:schemeClr val="tx1"/>
+                      </a:solidFill>
+                      <a:prstDash val="solid"/>
+                      <a:round/>
+                      <a:headEnd type="none" w="med" len="med"/>
+                      <a:tailEnd type="none" w="med" len="med"/>
+                    </a:lnB>
+                    <a:lnTlToBr w="12700" cmpd="sng">
+                      <a:noFill/>
+                      <a:prstDash val="solid"/>
+                    </a:lnTlToBr>
+                    <a:lnBlToTr w="12700" cmpd="sng">
+                      <a:noFill/>
+                      <a:prstDash val="solid"/>
+                    </a:lnBlToTr>
+                    <a:solidFill>
+                      <a:srgbClr val="779556"/>
+                    </a:solidFill>
+                  </a:tcPr>
+                </a:tc>
+                <a:extLst>
+                  <a:ext uri="{0D108BD9-81ED-4DB2-BD59-A6C34878D82A}">
+                    <a16:rowId xmlns:a16="http://schemas.microsoft.com/office/drawing/2014/main" val="1830709642"/>
+                  </a:ext>
+                </a:extLst>
+              </a:tr>
+            </a:tbl>
+          </a:graphicData>
+        </a:graphic>
+      </p:graphicFrame>
+      <p:sp>
+        <p:nvSpPr>
+          <p:cNvPr id="5" name="Figura a mano libera: forma 4">
+            <a:extLst>
+              <a:ext uri="{FF2B5EF4-FFF2-40B4-BE49-F238E27FC236}">
+                <a16:creationId xmlns:a16="http://schemas.microsoft.com/office/drawing/2014/main" id="{7DBC9D94-60D7-0A7F-CAA8-1AC5C799CA6D}"/>
+              </a:ext>
+            </a:extLst>
+          </p:cNvPr>
+          <p:cNvSpPr/>
+          <p:nvPr/>
+        </p:nvSpPr>
+        <p:spPr>
+          <a:xfrm>
+            <a:off x="6703940" y="2169742"/>
+            <a:ext cx="359384" cy="647537"/>
+          </a:xfrm>
+          <a:custGeom>
+            <a:avLst/>
+            <a:gdLst>
+              <a:gd name="connsiteX0" fmla="*/ 1770877 w 2064847"/>
+              <a:gd name="connsiteY0" fmla="*/ 3075239 h 3720436"/>
+              <a:gd name="connsiteX1" fmla="*/ 1883183 w 2064847"/>
+              <a:gd name="connsiteY1" fmla="*/ 2887126 h 3720436"/>
+              <a:gd name="connsiteX2" fmla="*/ 1883183 w 2064847"/>
+              <a:gd name="connsiteY2" fmla="*/ 2868596 h 3720436"/>
+              <a:gd name="connsiteX3" fmla="*/ 1714724 w 2064847"/>
+              <a:gd name="connsiteY3" fmla="*/ 2658584 h 3720436"/>
+              <a:gd name="connsiteX4" fmla="*/ 1714724 w 2064847"/>
+              <a:gd name="connsiteY4" fmla="*/ 2428918 h 3720436"/>
+              <a:gd name="connsiteX5" fmla="*/ 1801761 w 2064847"/>
+              <a:gd name="connsiteY5" fmla="*/ 1847173 h 3720436"/>
+              <a:gd name="connsiteX6" fmla="*/ 1296384 w 2064847"/>
+              <a:gd name="connsiteY6" fmla="*/ 1408057 h 3720436"/>
+              <a:gd name="connsiteX7" fmla="*/ 1184078 w 2064847"/>
+              <a:gd name="connsiteY7" fmla="*/ 1276659 h 3720436"/>
+              <a:gd name="connsiteX8" fmla="*/ 1364891 w 2064847"/>
+              <a:gd name="connsiteY8" fmla="*/ 1313158 h 3720436"/>
+              <a:gd name="connsiteX9" fmla="*/ 1576587 w 2064847"/>
+              <a:gd name="connsiteY9" fmla="*/ 1399072 h 3720436"/>
+              <a:gd name="connsiteX10" fmla="*/ 1851175 w 2064847"/>
+              <a:gd name="connsiteY10" fmla="*/ 1391211 h 3720436"/>
+              <a:gd name="connsiteX11" fmla="*/ 2055011 w 2064847"/>
+              <a:gd name="connsiteY11" fmla="*/ 982417 h 3720436"/>
+              <a:gd name="connsiteX12" fmla="*/ 1622633 w 2064847"/>
+              <a:gd name="connsiteY12" fmla="*/ 610123 h 3720436"/>
+              <a:gd name="connsiteX13" fmla="*/ 1607472 w 2064847"/>
+              <a:gd name="connsiteY13" fmla="*/ 503994 h 3720436"/>
+              <a:gd name="connsiteX14" fmla="*/ 1251462 w 2064847"/>
+              <a:gd name="connsiteY14" fmla="*/ 244567 h 3720436"/>
+              <a:gd name="connsiteX15" fmla="*/ 1228439 w 2064847"/>
+              <a:gd name="connsiteY15" fmla="*/ 19955 h 3720436"/>
+              <a:gd name="connsiteX16" fmla="*/ 180625 w 2064847"/>
+              <a:gd name="connsiteY16" fmla="*/ 571378 h 3720436"/>
+              <a:gd name="connsiteX17" fmla="*/ 164902 w 2064847"/>
+              <a:gd name="connsiteY17" fmla="*/ 1862896 h 3720436"/>
+              <a:gd name="connsiteX18" fmla="*/ 364806 w 2064847"/>
+              <a:gd name="connsiteY18" fmla="*/ 2368273 h 3720436"/>
+              <a:gd name="connsiteX19" fmla="*/ 364806 w 2064847"/>
+              <a:gd name="connsiteY19" fmla="*/ 2658584 h 3720436"/>
+              <a:gd name="connsiteX20" fmla="*/ 196347 w 2064847"/>
+              <a:gd name="connsiteY20" fmla="*/ 2868596 h 3720436"/>
+              <a:gd name="connsiteX21" fmla="*/ 196347 w 2064847"/>
+              <a:gd name="connsiteY21" fmla="*/ 2887126 h 3720436"/>
+              <a:gd name="connsiteX22" fmla="*/ 308653 w 2064847"/>
+              <a:gd name="connsiteY22" fmla="*/ 3075239 h 3720436"/>
+              <a:gd name="connsiteX23" fmla="*/ 308653 w 2064847"/>
+              <a:gd name="connsiteY23" fmla="*/ 3271212 h 3720436"/>
+              <a:gd name="connsiteX24" fmla="*/ 84041 w 2064847"/>
+              <a:gd name="connsiteY24" fmla="*/ 3271212 h 3720436"/>
+              <a:gd name="connsiteX25" fmla="*/ 84041 w 2064847"/>
+              <a:gd name="connsiteY25" fmla="*/ 3720436 h 3720436"/>
+              <a:gd name="connsiteX26" fmla="*/ 1993242 w 2064847"/>
+              <a:gd name="connsiteY26" fmla="*/ 3720436 h 3720436"/>
+              <a:gd name="connsiteX27" fmla="*/ 1993242 w 2064847"/>
+              <a:gd name="connsiteY27" fmla="*/ 3271212 h 3720436"/>
+              <a:gd name="connsiteX28" fmla="*/ 1768630 w 2064847"/>
+              <a:gd name="connsiteY28" fmla="*/ 3271212 h 3720436"/>
+            </a:gdLst>
+            <a:ahLst/>
+            <a:cxnLst>
+              <a:cxn ang="0">
+                <a:pos x="connsiteX0" y="connsiteY0"/>
+              </a:cxn>
+              <a:cxn ang="0">
+                <a:pos x="connsiteX1" y="connsiteY1"/>
+              </a:cxn>
+              <a:cxn ang="0">
+                <a:pos x="connsiteX2" y="connsiteY2"/>
+              </a:cxn>
+              <a:cxn ang="0">
+                <a:pos x="connsiteX3" y="connsiteY3"/>
+              </a:cxn>
+              <a:cxn ang="0">
+                <a:pos x="connsiteX4" y="connsiteY4"/>
+              </a:cxn>
+              <a:cxn ang="0">
+                <a:pos x="connsiteX5" y="connsiteY5"/>
+              </a:cxn>
+              <a:cxn ang="0">
+                <a:pos x="connsiteX6" y="connsiteY6"/>
+              </a:cxn>
+              <a:cxn ang="0">
+                <a:pos x="connsiteX7" y="connsiteY7"/>
+              </a:cxn>
+              <a:cxn ang="0">
+                <a:pos x="connsiteX8" y="connsiteY8"/>
+              </a:cxn>
+              <a:cxn ang="0">
+                <a:pos x="connsiteX9" y="connsiteY9"/>
+              </a:cxn>
+              <a:cxn ang="0">
+                <a:pos x="connsiteX10" y="connsiteY10"/>
+              </a:cxn>
+              <a:cxn ang="0">
+                <a:pos x="connsiteX11" y="connsiteY11"/>
+              </a:cxn>
+              <a:cxn ang="0">
+                <a:pos x="connsiteX12" y="connsiteY12"/>
+              </a:cxn>
+              <a:cxn ang="0">
+                <a:pos x="connsiteX13" y="connsiteY13"/>
+              </a:cxn>
+              <a:cxn ang="0">
+                <a:pos x="connsiteX14" y="connsiteY14"/>
+              </a:cxn>
+              <a:cxn ang="0">
+                <a:pos x="connsiteX15" y="connsiteY15"/>
+              </a:cxn>
+              <a:cxn ang="0">
+                <a:pos x="connsiteX16" y="connsiteY16"/>
+              </a:cxn>
+              <a:cxn ang="0">
+                <a:pos x="connsiteX17" y="connsiteY17"/>
+              </a:cxn>
+              <a:cxn ang="0">
+                <a:pos x="connsiteX18" y="connsiteY18"/>
+              </a:cxn>
+              <a:cxn ang="0">
+                <a:pos x="connsiteX19" y="connsiteY19"/>
+              </a:cxn>
+              <a:cxn ang="0">
+                <a:pos x="connsiteX20" y="connsiteY20"/>
+              </a:cxn>
+              <a:cxn ang="0">
+                <a:pos x="connsiteX21" y="connsiteY21"/>
+              </a:cxn>
+              <a:cxn ang="0">
+                <a:pos x="connsiteX22" y="connsiteY22"/>
+              </a:cxn>
+              <a:cxn ang="0">
+                <a:pos x="connsiteX23" y="connsiteY23"/>
+              </a:cxn>
+              <a:cxn ang="0">
+                <a:pos x="connsiteX24" y="connsiteY24"/>
+              </a:cxn>
+              <a:cxn ang="0">
+                <a:pos x="connsiteX25" y="connsiteY25"/>
+              </a:cxn>
+              <a:cxn ang="0">
+                <a:pos x="connsiteX26" y="connsiteY26"/>
+              </a:cxn>
+              <a:cxn ang="0">
+                <a:pos x="connsiteX27" y="connsiteY27"/>
+              </a:cxn>
+              <a:cxn ang="0">
+                <a:pos x="connsiteX28" y="connsiteY28"/>
+              </a:cxn>
+            </a:cxnLst>
+            <a:rect l="l" t="t" r="r" b="b"/>
+            <a:pathLst>
+              <a:path w="2064847" h="3720436">
+                <a:moveTo>
+                  <a:pt x="1770877" y="3075239"/>
+                </a:moveTo>
+                <a:cubicBezTo>
+                  <a:pt x="1839580" y="3037459"/>
+                  <a:pt x="1882526" y="2965527"/>
+                  <a:pt x="1883183" y="2887126"/>
+                </a:cubicBezTo>
+                <a:lnTo>
+                  <a:pt x="1883183" y="2868596"/>
+                </a:lnTo>
+                <a:cubicBezTo>
+                  <a:pt x="1882582" y="2767975"/>
+                  <a:pt x="1812817" y="2681000"/>
+                  <a:pt x="1714724" y="2658584"/>
+                </a:cubicBezTo>
+                <a:lnTo>
+                  <a:pt x="1714724" y="2428918"/>
+                </a:lnTo>
+                <a:cubicBezTo>
+                  <a:pt x="1858110" y="2270162"/>
+                  <a:pt x="1892403" y="2040940"/>
+                  <a:pt x="1801761" y="1847173"/>
+                </a:cubicBezTo>
+                <a:cubicBezTo>
+                  <a:pt x="1733254" y="1691068"/>
+                  <a:pt x="1411498" y="1471510"/>
+                  <a:pt x="1296384" y="1408057"/>
+                </a:cubicBezTo>
+                <a:cubicBezTo>
+                  <a:pt x="1244448" y="1379088"/>
+                  <a:pt x="1204602" y="1332475"/>
+                  <a:pt x="1184078" y="1276659"/>
+                </a:cubicBezTo>
+                <a:cubicBezTo>
+                  <a:pt x="1236340" y="1314152"/>
+                  <a:pt x="1302173" y="1327444"/>
+                  <a:pt x="1364891" y="1313158"/>
+                </a:cubicBezTo>
+                <a:cubicBezTo>
+                  <a:pt x="1465405" y="1276659"/>
+                  <a:pt x="1552442" y="1369311"/>
+                  <a:pt x="1576587" y="1399072"/>
+                </a:cubicBezTo>
+                <a:cubicBezTo>
+                  <a:pt x="1638917" y="1468141"/>
+                  <a:pt x="1750662" y="1433887"/>
+                  <a:pt x="1851175" y="1391211"/>
+                </a:cubicBezTo>
+                <a:cubicBezTo>
+                  <a:pt x="2009274" y="1322418"/>
+                  <a:pt x="2095205" y="1150084"/>
+                  <a:pt x="2055011" y="982417"/>
+                </a:cubicBezTo>
+                <a:cubicBezTo>
+                  <a:pt x="2052203" y="896503"/>
+                  <a:pt x="1622633" y="610123"/>
+                  <a:pt x="1622633" y="610123"/>
+                </a:cubicBezTo>
+                <a:lnTo>
+                  <a:pt x="1607472" y="503994"/>
+                </a:lnTo>
+                <a:cubicBezTo>
+                  <a:pt x="1607472" y="485464"/>
+                  <a:pt x="1541211" y="293982"/>
+                  <a:pt x="1251462" y="244567"/>
+                </a:cubicBezTo>
+                <a:cubicBezTo>
+                  <a:pt x="1251462" y="244567"/>
+                  <a:pt x="1303684" y="57016"/>
+                  <a:pt x="1228439" y="19955"/>
+                </a:cubicBezTo>
+                <a:cubicBezTo>
+                  <a:pt x="1071211" y="-52482"/>
+                  <a:pt x="498450" y="59263"/>
+                  <a:pt x="180625" y="571378"/>
+                </a:cubicBezTo>
+                <a:cubicBezTo>
+                  <a:pt x="-54656" y="950410"/>
+                  <a:pt x="-60272" y="1409180"/>
+                  <a:pt x="164902" y="1862896"/>
+                </a:cubicBezTo>
+                <a:cubicBezTo>
+                  <a:pt x="221055" y="1975202"/>
+                  <a:pt x="364806" y="2199814"/>
+                  <a:pt x="364806" y="2368273"/>
+                </a:cubicBezTo>
+                <a:lnTo>
+                  <a:pt x="364806" y="2658584"/>
+                </a:lnTo>
+                <a:cubicBezTo>
+                  <a:pt x="266713" y="2681000"/>
+                  <a:pt x="196948" y="2767975"/>
+                  <a:pt x="196347" y="2868596"/>
+                </a:cubicBezTo>
+                <a:lnTo>
+                  <a:pt x="196347" y="2887126"/>
+                </a:lnTo>
+                <a:cubicBezTo>
+                  <a:pt x="197004" y="2965527"/>
+                  <a:pt x="239950" y="3037459"/>
+                  <a:pt x="308653" y="3075239"/>
+                </a:cubicBezTo>
+                <a:lnTo>
+                  <a:pt x="308653" y="3271212"/>
+                </a:lnTo>
+                <a:lnTo>
+                  <a:pt x="84041" y="3271212"/>
+                </a:lnTo>
+                <a:lnTo>
+                  <a:pt x="84041" y="3720436"/>
+                </a:lnTo>
+                <a:lnTo>
+                  <a:pt x="1993242" y="3720436"/>
+                </a:lnTo>
+                <a:lnTo>
+                  <a:pt x="1993242" y="3271212"/>
+                </a:lnTo>
+                <a:lnTo>
+                  <a:pt x="1768630" y="3271212"/>
+                </a:lnTo>
+                <a:close/>
+              </a:path>
+            </a:pathLst>
+          </a:custGeom>
+          <a:solidFill>
+            <a:srgbClr val="575452"/>
+          </a:solidFill>
+          <a:ln w="19050" cap="flat">
+            <a:solidFill>
+              <a:schemeClr val="tx1"/>
+            </a:solidFill>
+            <a:prstDash val="solid"/>
+            <a:miter/>
+          </a:ln>
+        </p:spPr>
+        <p:txBody>
+          <a:bodyPr rtlCol="0" anchor="ctr"/>
+          <a:lstStyle/>
+          <a:p>
+            <a:endParaRPr lang="it-IT"/>
+          </a:p>
+        </p:txBody>
+      </p:sp>
+    </p:spTree>
+    <p:extLst>
+      <p:ext uri="{BB962C8B-B14F-4D97-AF65-F5344CB8AC3E}">
+        <p14:creationId xmlns:p14="http://schemas.microsoft.com/office/powerpoint/2010/main" val="879517264"/>
+      </p:ext>
+    </p:extLst>
+  </p:cSld>
+  <p:clrMapOvr>
+    <a:masterClrMapping/>
+  </p:clrMapOvr>
+</p:sld>
+</file>
+
 <file path=ppt/slides/slide2.xml><?xml version="1.0" encoding="utf-8"?>
 <p:sld xmlns:a="http://schemas.openxmlformats.org/drawingml/2006/main" xmlns:r="http://schemas.openxmlformats.org/officeDocument/2006/relationships" xmlns:p="http://schemas.openxmlformats.org/presentationml/2006/main">
   <p:cSld>
@@ -14405,6 +16258,1466 @@
           </a:p>
         </p:txBody>
       </p:sp>
+      <p:sp>
+        <p:nvSpPr>
+          <p:cNvPr id="6" name="Ovale 5">
+            <a:extLst>
+              <a:ext uri="{FF2B5EF4-FFF2-40B4-BE49-F238E27FC236}">
+                <a16:creationId xmlns:a16="http://schemas.microsoft.com/office/drawing/2014/main" id="{55CA7339-CBDA-1430-E737-7F8766E3E89B}"/>
+              </a:ext>
+            </a:extLst>
+          </p:cNvPr>
+          <p:cNvSpPr/>
+          <p:nvPr/>
+        </p:nvSpPr>
+        <p:spPr>
+          <a:xfrm>
+            <a:off x="5876925" y="4185233"/>
+            <a:ext cx="438150" cy="438150"/>
+          </a:xfrm>
+          <a:prstGeom prst="ellipse">
+            <a:avLst/>
+          </a:prstGeom>
+        </p:spPr>
+        <p:style>
+          <a:lnRef idx="2">
+            <a:schemeClr val="accent1">
+              <a:shade val="15000"/>
+            </a:schemeClr>
+          </a:lnRef>
+          <a:fillRef idx="1">
+            <a:schemeClr val="accent1"/>
+          </a:fillRef>
+          <a:effectRef idx="0">
+            <a:schemeClr val="accent1"/>
+          </a:effectRef>
+          <a:fontRef idx="minor">
+            <a:schemeClr val="lt1"/>
+          </a:fontRef>
+        </p:style>
+        <p:txBody>
+          <a:bodyPr rtlCol="0" anchor="ctr"/>
+          <a:lstStyle/>
+          <a:p>
+            <a:pPr algn="ctr"/>
+            <a:endParaRPr lang="it-IT"/>
+          </a:p>
+        </p:txBody>
+      </p:sp>
+      <p:sp>
+        <p:nvSpPr>
+          <p:cNvPr id="7" name="Ovale 6">
+            <a:extLst>
+              <a:ext uri="{FF2B5EF4-FFF2-40B4-BE49-F238E27FC236}">
+                <a16:creationId xmlns:a16="http://schemas.microsoft.com/office/drawing/2014/main" id="{137284A3-1E30-B65B-BB6B-4A9C08DB787A}"/>
+              </a:ext>
+            </a:extLst>
+          </p:cNvPr>
+          <p:cNvSpPr/>
+          <p:nvPr/>
+        </p:nvSpPr>
+        <p:spPr>
+          <a:xfrm>
+            <a:off x="4076700" y="5061533"/>
+            <a:ext cx="438150" cy="438150"/>
+          </a:xfrm>
+          <a:prstGeom prst="ellipse">
+            <a:avLst/>
+          </a:prstGeom>
+        </p:spPr>
+        <p:style>
+          <a:lnRef idx="2">
+            <a:schemeClr val="accent1">
+              <a:shade val="15000"/>
+            </a:schemeClr>
+          </a:lnRef>
+          <a:fillRef idx="1">
+            <a:schemeClr val="accent1"/>
+          </a:fillRef>
+          <a:effectRef idx="0">
+            <a:schemeClr val="accent1"/>
+          </a:effectRef>
+          <a:fontRef idx="minor">
+            <a:schemeClr val="lt1"/>
+          </a:fontRef>
+        </p:style>
+        <p:txBody>
+          <a:bodyPr rtlCol="0" anchor="ctr"/>
+          <a:lstStyle/>
+          <a:p>
+            <a:pPr algn="ctr"/>
+            <a:endParaRPr lang="it-IT"/>
+          </a:p>
+        </p:txBody>
+      </p:sp>
+      <p:sp>
+        <p:nvSpPr>
+          <p:cNvPr id="8" name="Ovale 7">
+            <a:extLst>
+              <a:ext uri="{FF2B5EF4-FFF2-40B4-BE49-F238E27FC236}">
+                <a16:creationId xmlns:a16="http://schemas.microsoft.com/office/drawing/2014/main" id="{9F5D70C8-16D7-45F6-7267-4978E60F0CBD}"/>
+              </a:ext>
+            </a:extLst>
+          </p:cNvPr>
+          <p:cNvSpPr/>
+          <p:nvPr/>
+        </p:nvSpPr>
+        <p:spPr>
+          <a:xfrm>
+            <a:off x="5876925" y="5061533"/>
+            <a:ext cx="438150" cy="438150"/>
+          </a:xfrm>
+          <a:prstGeom prst="ellipse">
+            <a:avLst/>
+          </a:prstGeom>
+        </p:spPr>
+        <p:style>
+          <a:lnRef idx="2">
+            <a:schemeClr val="accent1">
+              <a:shade val="15000"/>
+            </a:schemeClr>
+          </a:lnRef>
+          <a:fillRef idx="1">
+            <a:schemeClr val="accent1"/>
+          </a:fillRef>
+          <a:effectRef idx="0">
+            <a:schemeClr val="accent1"/>
+          </a:effectRef>
+          <a:fontRef idx="minor">
+            <a:schemeClr val="lt1"/>
+          </a:fontRef>
+        </p:style>
+        <p:txBody>
+          <a:bodyPr rtlCol="0" anchor="ctr"/>
+          <a:lstStyle/>
+          <a:p>
+            <a:pPr algn="ctr"/>
+            <a:endParaRPr lang="it-IT"/>
+          </a:p>
+        </p:txBody>
+      </p:sp>
+      <p:sp>
+        <p:nvSpPr>
+          <p:cNvPr id="9" name="Ovale 8">
+            <a:extLst>
+              <a:ext uri="{FF2B5EF4-FFF2-40B4-BE49-F238E27FC236}">
+                <a16:creationId xmlns:a16="http://schemas.microsoft.com/office/drawing/2014/main" id="{479F3664-6DE2-EDB7-F9AC-55A0AE160848}"/>
+              </a:ext>
+            </a:extLst>
+          </p:cNvPr>
+          <p:cNvSpPr/>
+          <p:nvPr/>
+        </p:nvSpPr>
+        <p:spPr>
+          <a:xfrm>
+            <a:off x="7677150" y="5061533"/>
+            <a:ext cx="438150" cy="438150"/>
+          </a:xfrm>
+          <a:prstGeom prst="ellipse">
+            <a:avLst/>
+          </a:prstGeom>
+        </p:spPr>
+        <p:style>
+          <a:lnRef idx="2">
+            <a:schemeClr val="accent1">
+              <a:shade val="15000"/>
+            </a:schemeClr>
+          </a:lnRef>
+          <a:fillRef idx="1">
+            <a:schemeClr val="accent1"/>
+          </a:fillRef>
+          <a:effectRef idx="0">
+            <a:schemeClr val="accent1"/>
+          </a:effectRef>
+          <a:fontRef idx="minor">
+            <a:schemeClr val="lt1"/>
+          </a:fontRef>
+        </p:style>
+        <p:txBody>
+          <a:bodyPr rtlCol="0" anchor="ctr"/>
+          <a:lstStyle/>
+          <a:p>
+            <a:pPr algn="ctr"/>
+            <a:r>
+              <a:rPr lang="it-IT" sz="1000" dirty="0"/>
+              <a:t>S2</a:t>
+            </a:r>
+          </a:p>
+        </p:txBody>
+      </p:sp>
+      <p:sp>
+        <p:nvSpPr>
+          <p:cNvPr id="10" name="Ovale 9">
+            <a:extLst>
+              <a:ext uri="{FF2B5EF4-FFF2-40B4-BE49-F238E27FC236}">
+                <a16:creationId xmlns:a16="http://schemas.microsoft.com/office/drawing/2014/main" id="{A1AF1E89-C72A-8E2F-9144-C8D2919263D6}"/>
+              </a:ext>
+            </a:extLst>
+          </p:cNvPr>
+          <p:cNvSpPr/>
+          <p:nvPr/>
+        </p:nvSpPr>
+        <p:spPr>
+          <a:xfrm>
+            <a:off x="4076700" y="6061658"/>
+            <a:ext cx="438150" cy="438150"/>
+          </a:xfrm>
+          <a:prstGeom prst="ellipse">
+            <a:avLst/>
+          </a:prstGeom>
+        </p:spPr>
+        <p:style>
+          <a:lnRef idx="2">
+            <a:schemeClr val="accent1">
+              <a:shade val="15000"/>
+            </a:schemeClr>
+          </a:lnRef>
+          <a:fillRef idx="1">
+            <a:schemeClr val="accent1"/>
+          </a:fillRef>
+          <a:effectRef idx="0">
+            <a:schemeClr val="accent1"/>
+          </a:effectRef>
+          <a:fontRef idx="minor">
+            <a:schemeClr val="lt1"/>
+          </a:fontRef>
+        </p:style>
+        <p:txBody>
+          <a:bodyPr rtlCol="0" anchor="ctr"/>
+          <a:lstStyle/>
+          <a:p>
+            <a:pPr algn="ctr"/>
+            <a:endParaRPr lang="it-IT"/>
+          </a:p>
+        </p:txBody>
+      </p:sp>
+      <p:sp>
+        <p:nvSpPr>
+          <p:cNvPr id="11" name="Ovale 10">
+            <a:extLst>
+              <a:ext uri="{FF2B5EF4-FFF2-40B4-BE49-F238E27FC236}">
+                <a16:creationId xmlns:a16="http://schemas.microsoft.com/office/drawing/2014/main" id="{8DE3A40E-63EB-0484-D304-CCFD951D22BC}"/>
+              </a:ext>
+            </a:extLst>
+          </p:cNvPr>
+          <p:cNvSpPr/>
+          <p:nvPr/>
+        </p:nvSpPr>
+        <p:spPr>
+          <a:xfrm>
+            <a:off x="3457575" y="6061658"/>
+            <a:ext cx="438150" cy="438150"/>
+          </a:xfrm>
+          <a:prstGeom prst="ellipse">
+            <a:avLst/>
+          </a:prstGeom>
+        </p:spPr>
+        <p:style>
+          <a:lnRef idx="2">
+            <a:schemeClr val="accent1">
+              <a:shade val="15000"/>
+            </a:schemeClr>
+          </a:lnRef>
+          <a:fillRef idx="1">
+            <a:schemeClr val="accent1"/>
+          </a:fillRef>
+          <a:effectRef idx="0">
+            <a:schemeClr val="accent1"/>
+          </a:effectRef>
+          <a:fontRef idx="minor">
+            <a:schemeClr val="lt1"/>
+          </a:fontRef>
+        </p:style>
+        <p:txBody>
+          <a:bodyPr rtlCol="0" anchor="ctr"/>
+          <a:lstStyle/>
+          <a:p>
+            <a:pPr algn="ctr"/>
+            <a:r>
+              <a:rPr lang="it-IT" sz="1000" dirty="0"/>
+              <a:t>S1</a:t>
+            </a:r>
+          </a:p>
+        </p:txBody>
+      </p:sp>
+      <p:sp>
+        <p:nvSpPr>
+          <p:cNvPr id="13" name="Ovale 12">
+            <a:extLst>
+              <a:ext uri="{FF2B5EF4-FFF2-40B4-BE49-F238E27FC236}">
+                <a16:creationId xmlns:a16="http://schemas.microsoft.com/office/drawing/2014/main" id="{7BFA1A14-80D7-9221-D7AE-B8EACA72E67B}"/>
+              </a:ext>
+            </a:extLst>
+          </p:cNvPr>
+          <p:cNvSpPr/>
+          <p:nvPr/>
+        </p:nvSpPr>
+        <p:spPr>
+          <a:xfrm>
+            <a:off x="2838450" y="6061658"/>
+            <a:ext cx="438150" cy="438150"/>
+          </a:xfrm>
+          <a:prstGeom prst="ellipse">
+            <a:avLst/>
+          </a:prstGeom>
+        </p:spPr>
+        <p:style>
+          <a:lnRef idx="2">
+            <a:schemeClr val="accent1">
+              <a:shade val="15000"/>
+            </a:schemeClr>
+          </a:lnRef>
+          <a:fillRef idx="1">
+            <a:schemeClr val="accent1"/>
+          </a:fillRef>
+          <a:effectRef idx="0">
+            <a:schemeClr val="accent1"/>
+          </a:effectRef>
+          <a:fontRef idx="minor">
+            <a:schemeClr val="lt1"/>
+          </a:fontRef>
+        </p:style>
+        <p:txBody>
+          <a:bodyPr rtlCol="0" anchor="ctr"/>
+          <a:lstStyle/>
+          <a:p>
+            <a:pPr algn="ctr"/>
+            <a:endParaRPr lang="it-IT" sz="1000" dirty="0"/>
+          </a:p>
+        </p:txBody>
+      </p:sp>
+      <p:sp>
+        <p:nvSpPr>
+          <p:cNvPr id="14" name="Ovale 13">
+            <a:extLst>
+              <a:ext uri="{FF2B5EF4-FFF2-40B4-BE49-F238E27FC236}">
+                <a16:creationId xmlns:a16="http://schemas.microsoft.com/office/drawing/2014/main" id="{E0609974-0496-E92A-3E3C-94F569E2D987}"/>
+              </a:ext>
+            </a:extLst>
+          </p:cNvPr>
+          <p:cNvSpPr/>
+          <p:nvPr/>
+        </p:nvSpPr>
+        <p:spPr>
+          <a:xfrm>
+            <a:off x="8915400" y="6061658"/>
+            <a:ext cx="438150" cy="438150"/>
+          </a:xfrm>
+          <a:prstGeom prst="ellipse">
+            <a:avLst/>
+          </a:prstGeom>
+        </p:spPr>
+        <p:style>
+          <a:lnRef idx="2">
+            <a:schemeClr val="accent1">
+              <a:shade val="15000"/>
+            </a:schemeClr>
+          </a:lnRef>
+          <a:fillRef idx="1">
+            <a:schemeClr val="accent1"/>
+          </a:fillRef>
+          <a:effectRef idx="0">
+            <a:schemeClr val="accent1"/>
+          </a:effectRef>
+          <a:fontRef idx="minor">
+            <a:schemeClr val="lt1"/>
+          </a:fontRef>
+        </p:style>
+        <p:txBody>
+          <a:bodyPr rtlCol="0" anchor="ctr"/>
+          <a:lstStyle/>
+          <a:p>
+            <a:pPr algn="ctr"/>
+            <a:endParaRPr lang="it-IT"/>
+          </a:p>
+        </p:txBody>
+      </p:sp>
+      <p:sp>
+        <p:nvSpPr>
+          <p:cNvPr id="15" name="Ovale 14">
+            <a:extLst>
+              <a:ext uri="{FF2B5EF4-FFF2-40B4-BE49-F238E27FC236}">
+                <a16:creationId xmlns:a16="http://schemas.microsoft.com/office/drawing/2014/main" id="{80017BA8-AE7D-2199-72DC-8A2D26BEF767}"/>
+              </a:ext>
+            </a:extLst>
+          </p:cNvPr>
+          <p:cNvSpPr/>
+          <p:nvPr/>
+        </p:nvSpPr>
+        <p:spPr>
+          <a:xfrm>
+            <a:off x="8296275" y="6061658"/>
+            <a:ext cx="438150" cy="438150"/>
+          </a:xfrm>
+          <a:prstGeom prst="ellipse">
+            <a:avLst/>
+          </a:prstGeom>
+        </p:spPr>
+        <p:style>
+          <a:lnRef idx="2">
+            <a:schemeClr val="accent1">
+              <a:shade val="15000"/>
+            </a:schemeClr>
+          </a:lnRef>
+          <a:fillRef idx="1">
+            <a:schemeClr val="accent1"/>
+          </a:fillRef>
+          <a:effectRef idx="0">
+            <a:schemeClr val="accent1"/>
+          </a:effectRef>
+          <a:fontRef idx="minor">
+            <a:schemeClr val="lt1"/>
+          </a:fontRef>
+        </p:style>
+        <p:txBody>
+          <a:bodyPr rtlCol="0" anchor="ctr"/>
+          <a:lstStyle/>
+          <a:p>
+            <a:pPr algn="ctr"/>
+            <a:endParaRPr lang="it-IT"/>
+          </a:p>
+        </p:txBody>
+      </p:sp>
+      <p:sp>
+        <p:nvSpPr>
+          <p:cNvPr id="16" name="Ovale 15">
+            <a:extLst>
+              <a:ext uri="{FF2B5EF4-FFF2-40B4-BE49-F238E27FC236}">
+                <a16:creationId xmlns:a16="http://schemas.microsoft.com/office/drawing/2014/main" id="{465F4D1F-854B-BC03-9786-C5F7B1E0AA74}"/>
+              </a:ext>
+            </a:extLst>
+          </p:cNvPr>
+          <p:cNvSpPr/>
+          <p:nvPr/>
+        </p:nvSpPr>
+        <p:spPr>
+          <a:xfrm>
+            <a:off x="7677150" y="6061658"/>
+            <a:ext cx="438150" cy="438150"/>
+          </a:xfrm>
+          <a:prstGeom prst="ellipse">
+            <a:avLst/>
+          </a:prstGeom>
+        </p:spPr>
+        <p:style>
+          <a:lnRef idx="2">
+            <a:schemeClr val="accent1">
+              <a:shade val="15000"/>
+            </a:schemeClr>
+          </a:lnRef>
+          <a:fillRef idx="1">
+            <a:schemeClr val="accent1"/>
+          </a:fillRef>
+          <a:effectRef idx="0">
+            <a:schemeClr val="accent1"/>
+          </a:effectRef>
+          <a:fontRef idx="minor">
+            <a:schemeClr val="lt1"/>
+          </a:fontRef>
+        </p:style>
+        <p:txBody>
+          <a:bodyPr rtlCol="0" anchor="ctr"/>
+          <a:lstStyle/>
+          <a:p>
+            <a:pPr algn="ctr"/>
+            <a:endParaRPr lang="it-IT"/>
+          </a:p>
+        </p:txBody>
+      </p:sp>
+      <p:sp>
+        <p:nvSpPr>
+          <p:cNvPr id="17" name="Ovale 16">
+            <a:extLst>
+              <a:ext uri="{FF2B5EF4-FFF2-40B4-BE49-F238E27FC236}">
+                <a16:creationId xmlns:a16="http://schemas.microsoft.com/office/drawing/2014/main" id="{0B2F31F3-2D2E-2D60-CD23-5AB417C8B306}"/>
+              </a:ext>
+            </a:extLst>
+          </p:cNvPr>
+          <p:cNvSpPr/>
+          <p:nvPr/>
+        </p:nvSpPr>
+        <p:spPr>
+          <a:xfrm>
+            <a:off x="6496050" y="6061658"/>
+            <a:ext cx="438150" cy="438150"/>
+          </a:xfrm>
+          <a:prstGeom prst="ellipse">
+            <a:avLst/>
+          </a:prstGeom>
+        </p:spPr>
+        <p:style>
+          <a:lnRef idx="2">
+            <a:schemeClr val="accent1">
+              <a:shade val="15000"/>
+            </a:schemeClr>
+          </a:lnRef>
+          <a:fillRef idx="1">
+            <a:schemeClr val="accent1"/>
+          </a:fillRef>
+          <a:effectRef idx="0">
+            <a:schemeClr val="accent1"/>
+          </a:effectRef>
+          <a:fontRef idx="minor">
+            <a:schemeClr val="lt1"/>
+          </a:fontRef>
+        </p:style>
+        <p:txBody>
+          <a:bodyPr rtlCol="0" anchor="ctr"/>
+          <a:lstStyle/>
+          <a:p>
+            <a:pPr algn="ctr"/>
+            <a:endParaRPr lang="it-IT"/>
+          </a:p>
+        </p:txBody>
+      </p:sp>
+      <p:sp>
+        <p:nvSpPr>
+          <p:cNvPr id="26" name="Ovale 25">
+            <a:extLst>
+              <a:ext uri="{FF2B5EF4-FFF2-40B4-BE49-F238E27FC236}">
+                <a16:creationId xmlns:a16="http://schemas.microsoft.com/office/drawing/2014/main" id="{FAC7F8E9-F02A-2B9D-B57B-DD6BCC6369F0}"/>
+              </a:ext>
+            </a:extLst>
+          </p:cNvPr>
+          <p:cNvSpPr/>
+          <p:nvPr/>
+        </p:nvSpPr>
+        <p:spPr>
+          <a:xfrm>
+            <a:off x="5876925" y="6061658"/>
+            <a:ext cx="438150" cy="438150"/>
+          </a:xfrm>
+          <a:prstGeom prst="ellipse">
+            <a:avLst/>
+          </a:prstGeom>
+        </p:spPr>
+        <p:style>
+          <a:lnRef idx="2">
+            <a:schemeClr val="accent1">
+              <a:shade val="15000"/>
+            </a:schemeClr>
+          </a:lnRef>
+          <a:fillRef idx="1">
+            <a:schemeClr val="accent1"/>
+          </a:fillRef>
+          <a:effectRef idx="0">
+            <a:schemeClr val="accent1"/>
+          </a:effectRef>
+          <a:fontRef idx="minor">
+            <a:schemeClr val="lt1"/>
+          </a:fontRef>
+        </p:style>
+        <p:txBody>
+          <a:bodyPr rtlCol="0" anchor="ctr"/>
+          <a:lstStyle/>
+          <a:p>
+            <a:pPr algn="ctr"/>
+            <a:endParaRPr lang="it-IT"/>
+          </a:p>
+        </p:txBody>
+      </p:sp>
+      <p:sp>
+        <p:nvSpPr>
+          <p:cNvPr id="28" name="Ovale 27">
+            <a:extLst>
+              <a:ext uri="{FF2B5EF4-FFF2-40B4-BE49-F238E27FC236}">
+                <a16:creationId xmlns:a16="http://schemas.microsoft.com/office/drawing/2014/main" id="{262970F9-2889-DB8B-DB89-1E804CD80148}"/>
+              </a:ext>
+            </a:extLst>
+          </p:cNvPr>
+          <p:cNvSpPr/>
+          <p:nvPr/>
+        </p:nvSpPr>
+        <p:spPr>
+          <a:xfrm>
+            <a:off x="5257800" y="6061658"/>
+            <a:ext cx="438150" cy="438150"/>
+          </a:xfrm>
+          <a:prstGeom prst="ellipse">
+            <a:avLst/>
+          </a:prstGeom>
+        </p:spPr>
+        <p:style>
+          <a:lnRef idx="2">
+            <a:schemeClr val="accent1">
+              <a:shade val="15000"/>
+            </a:schemeClr>
+          </a:lnRef>
+          <a:fillRef idx="1">
+            <a:schemeClr val="accent1"/>
+          </a:fillRef>
+          <a:effectRef idx="0">
+            <a:schemeClr val="accent1"/>
+          </a:effectRef>
+          <a:fontRef idx="minor">
+            <a:schemeClr val="lt1"/>
+          </a:fontRef>
+        </p:style>
+        <p:txBody>
+          <a:bodyPr rtlCol="0" anchor="ctr"/>
+          <a:lstStyle/>
+          <a:p>
+            <a:pPr algn="ctr"/>
+            <a:endParaRPr lang="it-IT"/>
+          </a:p>
+        </p:txBody>
+      </p:sp>
+      <p:cxnSp>
+        <p:nvCxnSpPr>
+          <p:cNvPr id="29" name="Connettore diritto 28">
+            <a:extLst>
+              <a:ext uri="{FF2B5EF4-FFF2-40B4-BE49-F238E27FC236}">
+                <a16:creationId xmlns:a16="http://schemas.microsoft.com/office/drawing/2014/main" id="{E0B4CD12-5027-00D1-93DE-63395AF014F7}"/>
+              </a:ext>
+            </a:extLst>
+          </p:cNvPr>
+          <p:cNvCxnSpPr>
+            <a:cxnSpLocks/>
+            <a:stCxn id="8" idx="4"/>
+            <a:endCxn id="26" idx="0"/>
+          </p:cNvCxnSpPr>
+          <p:nvPr/>
+        </p:nvCxnSpPr>
+        <p:spPr>
+          <a:xfrm>
+            <a:off x="6096000" y="5499683"/>
+            <a:ext cx="0" cy="561975"/>
+          </a:xfrm>
+          <a:prstGeom prst="line">
+            <a:avLst/>
+          </a:prstGeom>
+          <a:ln w="12700"/>
+        </p:spPr>
+        <p:style>
+          <a:lnRef idx="1">
+            <a:schemeClr val="accent1"/>
+          </a:lnRef>
+          <a:fillRef idx="0">
+            <a:schemeClr val="accent1"/>
+          </a:fillRef>
+          <a:effectRef idx="0">
+            <a:schemeClr val="accent1"/>
+          </a:effectRef>
+          <a:fontRef idx="minor">
+            <a:schemeClr val="tx1"/>
+          </a:fontRef>
+        </p:style>
+      </p:cxnSp>
+      <p:cxnSp>
+        <p:nvCxnSpPr>
+          <p:cNvPr id="31" name="Connettore diritto 30">
+            <a:extLst>
+              <a:ext uri="{FF2B5EF4-FFF2-40B4-BE49-F238E27FC236}">
+                <a16:creationId xmlns:a16="http://schemas.microsoft.com/office/drawing/2014/main" id="{A4AC8A59-663F-15E8-0C9D-BDFEEFAE9CE5}"/>
+              </a:ext>
+            </a:extLst>
+          </p:cNvPr>
+          <p:cNvCxnSpPr>
+            <a:cxnSpLocks/>
+            <a:stCxn id="7" idx="2"/>
+            <a:endCxn id="13" idx="0"/>
+          </p:cNvCxnSpPr>
+          <p:nvPr/>
+        </p:nvCxnSpPr>
+        <p:spPr>
+          <a:xfrm flipH="1">
+            <a:off x="3057525" y="5280608"/>
+            <a:ext cx="1019175" cy="781050"/>
+          </a:xfrm>
+          <a:prstGeom prst="line">
+            <a:avLst/>
+          </a:prstGeom>
+          <a:ln w="12700"/>
+        </p:spPr>
+        <p:style>
+          <a:lnRef idx="1">
+            <a:schemeClr val="accent1"/>
+          </a:lnRef>
+          <a:fillRef idx="0">
+            <a:schemeClr val="accent1"/>
+          </a:fillRef>
+          <a:effectRef idx="0">
+            <a:schemeClr val="accent1"/>
+          </a:effectRef>
+          <a:fontRef idx="minor">
+            <a:schemeClr val="tx1"/>
+          </a:fontRef>
+        </p:style>
+      </p:cxnSp>
+      <p:cxnSp>
+        <p:nvCxnSpPr>
+          <p:cNvPr id="33" name="Connettore diritto 32">
+            <a:extLst>
+              <a:ext uri="{FF2B5EF4-FFF2-40B4-BE49-F238E27FC236}">
+                <a16:creationId xmlns:a16="http://schemas.microsoft.com/office/drawing/2014/main" id="{E8738CB3-D1CA-FA7B-8730-6E0B6F9542A6}"/>
+              </a:ext>
+            </a:extLst>
+          </p:cNvPr>
+          <p:cNvCxnSpPr>
+            <a:cxnSpLocks/>
+            <a:stCxn id="7" idx="3"/>
+            <a:endCxn id="11" idx="0"/>
+          </p:cNvCxnSpPr>
+          <p:nvPr/>
+        </p:nvCxnSpPr>
+        <p:spPr>
+          <a:xfrm flipH="1">
+            <a:off x="3676650" y="5435517"/>
+            <a:ext cx="464216" cy="626141"/>
+          </a:xfrm>
+          <a:prstGeom prst="line">
+            <a:avLst/>
+          </a:prstGeom>
+          <a:ln w="12700"/>
+        </p:spPr>
+        <p:style>
+          <a:lnRef idx="1">
+            <a:schemeClr val="accent1"/>
+          </a:lnRef>
+          <a:fillRef idx="0">
+            <a:schemeClr val="accent1"/>
+          </a:fillRef>
+          <a:effectRef idx="0">
+            <a:schemeClr val="accent1"/>
+          </a:effectRef>
+          <a:fontRef idx="minor">
+            <a:schemeClr val="tx1"/>
+          </a:fontRef>
+        </p:style>
+      </p:cxnSp>
+      <p:cxnSp>
+        <p:nvCxnSpPr>
+          <p:cNvPr id="36" name="Connettore diritto 35">
+            <a:extLst>
+              <a:ext uri="{FF2B5EF4-FFF2-40B4-BE49-F238E27FC236}">
+                <a16:creationId xmlns:a16="http://schemas.microsoft.com/office/drawing/2014/main" id="{C431C111-2B3D-D447-55C1-81D0E062EA01}"/>
+              </a:ext>
+            </a:extLst>
+          </p:cNvPr>
+          <p:cNvCxnSpPr>
+            <a:stCxn id="7" idx="4"/>
+            <a:endCxn id="10" idx="0"/>
+          </p:cNvCxnSpPr>
+          <p:nvPr/>
+        </p:nvCxnSpPr>
+        <p:spPr>
+          <a:xfrm>
+            <a:off x="4295775" y="5499683"/>
+            <a:ext cx="0" cy="561975"/>
+          </a:xfrm>
+          <a:prstGeom prst="line">
+            <a:avLst/>
+          </a:prstGeom>
+          <a:ln w="12700"/>
+        </p:spPr>
+        <p:style>
+          <a:lnRef idx="1">
+            <a:schemeClr val="accent1"/>
+          </a:lnRef>
+          <a:fillRef idx="0">
+            <a:schemeClr val="accent1"/>
+          </a:fillRef>
+          <a:effectRef idx="0">
+            <a:schemeClr val="accent1"/>
+          </a:effectRef>
+          <a:fontRef idx="minor">
+            <a:schemeClr val="tx1"/>
+          </a:fontRef>
+        </p:style>
+      </p:cxnSp>
+      <p:cxnSp>
+        <p:nvCxnSpPr>
+          <p:cNvPr id="37" name="Connettore diritto 36">
+            <a:extLst>
+              <a:ext uri="{FF2B5EF4-FFF2-40B4-BE49-F238E27FC236}">
+                <a16:creationId xmlns:a16="http://schemas.microsoft.com/office/drawing/2014/main" id="{1203141F-A72D-4D48-DA67-C622F95CA563}"/>
+              </a:ext>
+            </a:extLst>
+          </p:cNvPr>
+          <p:cNvCxnSpPr>
+            <a:cxnSpLocks/>
+            <a:stCxn id="6" idx="3"/>
+            <a:endCxn id="7" idx="0"/>
+          </p:cNvCxnSpPr>
+          <p:nvPr/>
+        </p:nvCxnSpPr>
+        <p:spPr>
+          <a:xfrm flipH="1">
+            <a:off x="4295775" y="4559217"/>
+            <a:ext cx="1645316" cy="502316"/>
+          </a:xfrm>
+          <a:prstGeom prst="line">
+            <a:avLst/>
+          </a:prstGeom>
+          <a:ln w="12700"/>
+        </p:spPr>
+        <p:style>
+          <a:lnRef idx="1">
+            <a:schemeClr val="accent1"/>
+          </a:lnRef>
+          <a:fillRef idx="0">
+            <a:schemeClr val="accent1"/>
+          </a:fillRef>
+          <a:effectRef idx="0">
+            <a:schemeClr val="accent1"/>
+          </a:effectRef>
+          <a:fontRef idx="minor">
+            <a:schemeClr val="tx1"/>
+          </a:fontRef>
+        </p:style>
+      </p:cxnSp>
+      <p:cxnSp>
+        <p:nvCxnSpPr>
+          <p:cNvPr id="39" name="Connettore diritto 38">
+            <a:extLst>
+              <a:ext uri="{FF2B5EF4-FFF2-40B4-BE49-F238E27FC236}">
+                <a16:creationId xmlns:a16="http://schemas.microsoft.com/office/drawing/2014/main" id="{3F50A2BB-7333-4B9B-D5B2-FD7E5BB8C558}"/>
+              </a:ext>
+            </a:extLst>
+          </p:cNvPr>
+          <p:cNvCxnSpPr>
+            <a:cxnSpLocks/>
+            <a:stCxn id="6" idx="4"/>
+            <a:endCxn id="8" idx="0"/>
+          </p:cNvCxnSpPr>
+          <p:nvPr/>
+        </p:nvCxnSpPr>
+        <p:spPr>
+          <a:xfrm>
+            <a:off x="6096000" y="4623383"/>
+            <a:ext cx="0" cy="438150"/>
+          </a:xfrm>
+          <a:prstGeom prst="line">
+            <a:avLst/>
+          </a:prstGeom>
+          <a:ln w="12700"/>
+        </p:spPr>
+        <p:style>
+          <a:lnRef idx="1">
+            <a:schemeClr val="accent1"/>
+          </a:lnRef>
+          <a:fillRef idx="0">
+            <a:schemeClr val="accent1"/>
+          </a:fillRef>
+          <a:effectRef idx="0">
+            <a:schemeClr val="accent1"/>
+          </a:effectRef>
+          <a:fontRef idx="minor">
+            <a:schemeClr val="tx1"/>
+          </a:fontRef>
+        </p:style>
+      </p:cxnSp>
+      <p:cxnSp>
+        <p:nvCxnSpPr>
+          <p:cNvPr id="40" name="Connettore diritto 39">
+            <a:extLst>
+              <a:ext uri="{FF2B5EF4-FFF2-40B4-BE49-F238E27FC236}">
+                <a16:creationId xmlns:a16="http://schemas.microsoft.com/office/drawing/2014/main" id="{70522948-B90E-08FF-4E3A-F4469087BC21}"/>
+              </a:ext>
+            </a:extLst>
+          </p:cNvPr>
+          <p:cNvCxnSpPr>
+            <a:cxnSpLocks/>
+            <a:stCxn id="6" idx="5"/>
+            <a:endCxn id="9" idx="0"/>
+          </p:cNvCxnSpPr>
+          <p:nvPr/>
+        </p:nvCxnSpPr>
+        <p:spPr>
+          <a:xfrm>
+            <a:off x="6250909" y="4559217"/>
+            <a:ext cx="1645316" cy="502316"/>
+          </a:xfrm>
+          <a:prstGeom prst="line">
+            <a:avLst/>
+          </a:prstGeom>
+          <a:ln w="12700"/>
+        </p:spPr>
+        <p:style>
+          <a:lnRef idx="1">
+            <a:schemeClr val="accent1"/>
+          </a:lnRef>
+          <a:fillRef idx="0">
+            <a:schemeClr val="accent1"/>
+          </a:fillRef>
+          <a:effectRef idx="0">
+            <a:schemeClr val="accent1"/>
+          </a:effectRef>
+          <a:fontRef idx="minor">
+            <a:schemeClr val="tx1"/>
+          </a:fontRef>
+        </p:style>
+      </p:cxnSp>
+      <p:cxnSp>
+        <p:nvCxnSpPr>
+          <p:cNvPr id="42" name="Connettore diritto 41">
+            <a:extLst>
+              <a:ext uri="{FF2B5EF4-FFF2-40B4-BE49-F238E27FC236}">
+                <a16:creationId xmlns:a16="http://schemas.microsoft.com/office/drawing/2014/main" id="{A3DDF113-3507-2B6F-C65C-AED53DCF0C20}"/>
+              </a:ext>
+            </a:extLst>
+          </p:cNvPr>
+          <p:cNvCxnSpPr>
+            <a:cxnSpLocks/>
+            <a:stCxn id="9" idx="4"/>
+            <a:endCxn id="16" idx="0"/>
+          </p:cNvCxnSpPr>
+          <p:nvPr/>
+        </p:nvCxnSpPr>
+        <p:spPr>
+          <a:xfrm>
+            <a:off x="7896225" y="5499683"/>
+            <a:ext cx="0" cy="561975"/>
+          </a:xfrm>
+          <a:prstGeom prst="line">
+            <a:avLst/>
+          </a:prstGeom>
+          <a:ln w="12700"/>
+        </p:spPr>
+        <p:style>
+          <a:lnRef idx="1">
+            <a:schemeClr val="accent1"/>
+          </a:lnRef>
+          <a:fillRef idx="0">
+            <a:schemeClr val="accent1"/>
+          </a:fillRef>
+          <a:effectRef idx="0">
+            <a:schemeClr val="accent1"/>
+          </a:effectRef>
+          <a:fontRef idx="minor">
+            <a:schemeClr val="tx1"/>
+          </a:fontRef>
+        </p:style>
+      </p:cxnSp>
+      <p:cxnSp>
+        <p:nvCxnSpPr>
+          <p:cNvPr id="43" name="Connettore diritto 42">
+            <a:extLst>
+              <a:ext uri="{FF2B5EF4-FFF2-40B4-BE49-F238E27FC236}">
+                <a16:creationId xmlns:a16="http://schemas.microsoft.com/office/drawing/2014/main" id="{2C88C6B8-10DC-5D16-84F8-0251E18FFFE3}"/>
+              </a:ext>
+            </a:extLst>
+          </p:cNvPr>
+          <p:cNvCxnSpPr>
+            <a:cxnSpLocks/>
+            <a:stCxn id="9" idx="5"/>
+            <a:endCxn id="15" idx="0"/>
+          </p:cNvCxnSpPr>
+          <p:nvPr/>
+        </p:nvCxnSpPr>
+        <p:spPr>
+          <a:xfrm>
+            <a:off x="8051134" y="5435517"/>
+            <a:ext cx="464216" cy="626141"/>
+          </a:xfrm>
+          <a:prstGeom prst="line">
+            <a:avLst/>
+          </a:prstGeom>
+          <a:ln w="12700"/>
+        </p:spPr>
+        <p:style>
+          <a:lnRef idx="1">
+            <a:schemeClr val="accent1"/>
+          </a:lnRef>
+          <a:fillRef idx="0">
+            <a:schemeClr val="accent1"/>
+          </a:fillRef>
+          <a:effectRef idx="0">
+            <a:schemeClr val="accent1"/>
+          </a:effectRef>
+          <a:fontRef idx="minor">
+            <a:schemeClr val="tx1"/>
+          </a:fontRef>
+        </p:style>
+      </p:cxnSp>
+      <p:cxnSp>
+        <p:nvCxnSpPr>
+          <p:cNvPr id="45" name="Connettore diritto 44">
+            <a:extLst>
+              <a:ext uri="{FF2B5EF4-FFF2-40B4-BE49-F238E27FC236}">
+                <a16:creationId xmlns:a16="http://schemas.microsoft.com/office/drawing/2014/main" id="{A6A7E137-3C3D-D4CE-756E-954A914C5E58}"/>
+              </a:ext>
+            </a:extLst>
+          </p:cNvPr>
+          <p:cNvCxnSpPr>
+            <a:cxnSpLocks/>
+            <a:stCxn id="9" idx="6"/>
+            <a:endCxn id="14" idx="0"/>
+          </p:cNvCxnSpPr>
+          <p:nvPr/>
+        </p:nvCxnSpPr>
+        <p:spPr>
+          <a:xfrm>
+            <a:off x="8115300" y="5280608"/>
+            <a:ext cx="1019175" cy="781050"/>
+          </a:xfrm>
+          <a:prstGeom prst="line">
+            <a:avLst/>
+          </a:prstGeom>
+          <a:ln w="12700"/>
+        </p:spPr>
+        <p:style>
+          <a:lnRef idx="1">
+            <a:schemeClr val="accent1"/>
+          </a:lnRef>
+          <a:fillRef idx="0">
+            <a:schemeClr val="accent1"/>
+          </a:fillRef>
+          <a:effectRef idx="0">
+            <a:schemeClr val="accent1"/>
+          </a:effectRef>
+          <a:fontRef idx="minor">
+            <a:schemeClr val="tx1"/>
+          </a:fontRef>
+        </p:style>
+      </p:cxnSp>
+      <p:cxnSp>
+        <p:nvCxnSpPr>
+          <p:cNvPr id="46" name="Connettore diritto 45">
+            <a:extLst>
+              <a:ext uri="{FF2B5EF4-FFF2-40B4-BE49-F238E27FC236}">
+                <a16:creationId xmlns:a16="http://schemas.microsoft.com/office/drawing/2014/main" id="{47D4D6C6-E03E-958B-BAA0-D3CB0A467FBE}"/>
+              </a:ext>
+            </a:extLst>
+          </p:cNvPr>
+          <p:cNvCxnSpPr>
+            <a:cxnSpLocks/>
+            <a:stCxn id="8" idx="5"/>
+            <a:endCxn id="17" idx="0"/>
+          </p:cNvCxnSpPr>
+          <p:nvPr/>
+        </p:nvCxnSpPr>
+        <p:spPr>
+          <a:xfrm>
+            <a:off x="6250909" y="5435517"/>
+            <a:ext cx="464216" cy="626141"/>
+          </a:xfrm>
+          <a:prstGeom prst="line">
+            <a:avLst/>
+          </a:prstGeom>
+          <a:ln w="12700"/>
+        </p:spPr>
+        <p:style>
+          <a:lnRef idx="1">
+            <a:schemeClr val="accent1"/>
+          </a:lnRef>
+          <a:fillRef idx="0">
+            <a:schemeClr val="accent1"/>
+          </a:fillRef>
+          <a:effectRef idx="0">
+            <a:schemeClr val="accent1"/>
+          </a:effectRef>
+          <a:fontRef idx="minor">
+            <a:schemeClr val="tx1"/>
+          </a:fontRef>
+        </p:style>
+      </p:cxnSp>
+      <p:cxnSp>
+        <p:nvCxnSpPr>
+          <p:cNvPr id="50" name="Connettore diritto 49">
+            <a:extLst>
+              <a:ext uri="{FF2B5EF4-FFF2-40B4-BE49-F238E27FC236}">
+                <a16:creationId xmlns:a16="http://schemas.microsoft.com/office/drawing/2014/main" id="{544C4056-925C-E8FE-D03B-263B0ECEC123}"/>
+              </a:ext>
+            </a:extLst>
+          </p:cNvPr>
+          <p:cNvCxnSpPr>
+            <a:cxnSpLocks/>
+            <a:stCxn id="28" idx="0"/>
+            <a:endCxn id="8" idx="3"/>
+          </p:cNvCxnSpPr>
+          <p:nvPr/>
+        </p:nvCxnSpPr>
+        <p:spPr>
+          <a:xfrm flipV="1">
+            <a:off x="5476875" y="5435517"/>
+            <a:ext cx="464216" cy="626141"/>
+          </a:xfrm>
+          <a:prstGeom prst="line">
+            <a:avLst/>
+          </a:prstGeom>
+          <a:ln w="12700"/>
+        </p:spPr>
+        <p:style>
+          <a:lnRef idx="1">
+            <a:schemeClr val="accent1"/>
+          </a:lnRef>
+          <a:fillRef idx="0">
+            <a:schemeClr val="accent1"/>
+          </a:fillRef>
+          <a:effectRef idx="0">
+            <a:schemeClr val="accent1"/>
+          </a:effectRef>
+          <a:fontRef idx="minor">
+            <a:schemeClr val="tx1"/>
+          </a:fontRef>
+        </p:style>
+      </p:cxnSp>
+      <p:cxnSp>
+        <p:nvCxnSpPr>
+          <p:cNvPr id="58" name="Connettore 2 57">
+            <a:extLst>
+              <a:ext uri="{FF2B5EF4-FFF2-40B4-BE49-F238E27FC236}">
+                <a16:creationId xmlns:a16="http://schemas.microsoft.com/office/drawing/2014/main" id="{A2E4979B-F7E9-B629-05A6-E1E53FFAFCD7}"/>
+              </a:ext>
+            </a:extLst>
+          </p:cNvPr>
+          <p:cNvCxnSpPr>
+            <a:cxnSpLocks/>
+          </p:cNvCxnSpPr>
+          <p:nvPr/>
+        </p:nvCxnSpPr>
+        <p:spPr>
+          <a:xfrm flipH="1">
+            <a:off x="4324785" y="4522228"/>
+            <a:ext cx="1474686" cy="452469"/>
+          </a:xfrm>
+          <a:prstGeom prst="straightConnector1">
+            <a:avLst/>
+          </a:prstGeom>
+          <a:ln>
+            <a:solidFill>
+              <a:srgbClr val="FF0000"/>
+            </a:solidFill>
+            <a:prstDash val="dash"/>
+            <a:tailEnd type="triangle"/>
+          </a:ln>
+        </p:spPr>
+        <p:style>
+          <a:lnRef idx="1">
+            <a:schemeClr val="accent1"/>
+          </a:lnRef>
+          <a:fillRef idx="0">
+            <a:schemeClr val="accent1"/>
+          </a:fillRef>
+          <a:effectRef idx="0">
+            <a:schemeClr val="accent1"/>
+          </a:effectRef>
+          <a:fontRef idx="minor">
+            <a:schemeClr val="tx1"/>
+          </a:fontRef>
+        </p:style>
+      </p:cxnSp>
+      <p:cxnSp>
+        <p:nvCxnSpPr>
+          <p:cNvPr id="61" name="Connettore 2 60">
+            <a:extLst>
+              <a:ext uri="{FF2B5EF4-FFF2-40B4-BE49-F238E27FC236}">
+                <a16:creationId xmlns:a16="http://schemas.microsoft.com/office/drawing/2014/main" id="{A00B7710-E7B9-309A-0684-3D7831F9FD7C}"/>
+              </a:ext>
+            </a:extLst>
+          </p:cNvPr>
+          <p:cNvCxnSpPr>
+            <a:cxnSpLocks/>
+          </p:cNvCxnSpPr>
+          <p:nvPr/>
+        </p:nvCxnSpPr>
+        <p:spPr>
+          <a:xfrm flipH="1">
+            <a:off x="3031792" y="5206986"/>
+            <a:ext cx="1019175" cy="777218"/>
+          </a:xfrm>
+          <a:prstGeom prst="straightConnector1">
+            <a:avLst/>
+          </a:prstGeom>
+          <a:ln>
+            <a:solidFill>
+              <a:srgbClr val="FF0000"/>
+            </a:solidFill>
+            <a:prstDash val="dash"/>
+            <a:tailEnd type="triangle"/>
+          </a:ln>
+        </p:spPr>
+        <p:style>
+          <a:lnRef idx="1">
+            <a:schemeClr val="accent1"/>
+          </a:lnRef>
+          <a:fillRef idx="0">
+            <a:schemeClr val="accent1"/>
+          </a:fillRef>
+          <a:effectRef idx="0">
+            <a:schemeClr val="accent1"/>
+          </a:effectRef>
+          <a:fontRef idx="minor">
+            <a:schemeClr val="tx1"/>
+          </a:fontRef>
+        </p:style>
+      </p:cxnSp>
+      <p:cxnSp>
+        <p:nvCxnSpPr>
+          <p:cNvPr id="63" name="Connettore 2 62">
+            <a:extLst>
+              <a:ext uri="{FF2B5EF4-FFF2-40B4-BE49-F238E27FC236}">
+                <a16:creationId xmlns:a16="http://schemas.microsoft.com/office/drawing/2014/main" id="{4EE4F587-F0AE-F941-4E80-1F4ED1F4EE31}"/>
+              </a:ext>
+            </a:extLst>
+          </p:cNvPr>
+          <p:cNvCxnSpPr>
+            <a:cxnSpLocks/>
+          </p:cNvCxnSpPr>
+          <p:nvPr/>
+        </p:nvCxnSpPr>
+        <p:spPr>
+          <a:xfrm flipH="1">
+            <a:off x="3788692" y="5518297"/>
+            <a:ext cx="365793" cy="539529"/>
+          </a:xfrm>
+          <a:prstGeom prst="straightConnector1">
+            <a:avLst/>
+          </a:prstGeom>
+          <a:ln>
+            <a:solidFill>
+              <a:srgbClr val="FF0000"/>
+            </a:solidFill>
+            <a:prstDash val="dash"/>
+            <a:tailEnd type="triangle"/>
+          </a:ln>
+        </p:spPr>
+        <p:style>
+          <a:lnRef idx="1">
+            <a:schemeClr val="accent1"/>
+          </a:lnRef>
+          <a:fillRef idx="0">
+            <a:schemeClr val="accent1"/>
+          </a:fillRef>
+          <a:effectRef idx="0">
+            <a:schemeClr val="accent1"/>
+          </a:effectRef>
+          <a:fontRef idx="minor">
+            <a:schemeClr val="tx1"/>
+          </a:fontRef>
+        </p:style>
+      </p:cxnSp>
+      <p:cxnSp>
+        <p:nvCxnSpPr>
+          <p:cNvPr id="66" name="Connettore 2 65">
+            <a:extLst>
+              <a:ext uri="{FF2B5EF4-FFF2-40B4-BE49-F238E27FC236}">
+                <a16:creationId xmlns:a16="http://schemas.microsoft.com/office/drawing/2014/main" id="{5F466194-3D23-1BBA-EDE9-6DF19C074E9F}"/>
+              </a:ext>
+            </a:extLst>
+          </p:cNvPr>
+          <p:cNvCxnSpPr>
+            <a:cxnSpLocks/>
+          </p:cNvCxnSpPr>
+          <p:nvPr/>
+        </p:nvCxnSpPr>
+        <p:spPr>
+          <a:xfrm flipV="1">
+            <a:off x="3205990" y="5400754"/>
+            <a:ext cx="806450" cy="636827"/>
+          </a:xfrm>
+          <a:prstGeom prst="straightConnector1">
+            <a:avLst/>
+          </a:prstGeom>
+          <a:ln>
+            <a:solidFill>
+              <a:srgbClr val="FF0000"/>
+            </a:solidFill>
+            <a:prstDash val="dash"/>
+            <a:tailEnd type="triangle"/>
+          </a:ln>
+        </p:spPr>
+        <p:style>
+          <a:lnRef idx="1">
+            <a:schemeClr val="accent1"/>
+          </a:lnRef>
+          <a:fillRef idx="0">
+            <a:schemeClr val="accent1"/>
+          </a:fillRef>
+          <a:effectRef idx="0">
+            <a:schemeClr val="accent1"/>
+          </a:effectRef>
+          <a:fontRef idx="minor">
+            <a:schemeClr val="tx1"/>
+          </a:fontRef>
+        </p:style>
+      </p:cxnSp>
+      <p:sp>
+        <p:nvSpPr>
+          <p:cNvPr id="76" name="CasellaDiTesto 75">
+            <a:extLst>
+              <a:ext uri="{FF2B5EF4-FFF2-40B4-BE49-F238E27FC236}">
+                <a16:creationId xmlns:a16="http://schemas.microsoft.com/office/drawing/2014/main" id="{4F416481-251B-528A-44EC-B1E2982B9AFA}"/>
+              </a:ext>
+            </a:extLst>
+          </p:cNvPr>
+          <p:cNvSpPr txBox="1"/>
+          <p:nvPr/>
+        </p:nvSpPr>
+        <p:spPr>
+          <a:xfrm>
+            <a:off x="4933727" y="4464921"/>
+            <a:ext cx="256802" cy="261610"/>
+          </a:xfrm>
+          <a:prstGeom prst="rect">
+            <a:avLst/>
+          </a:prstGeom>
+          <a:noFill/>
+        </p:spPr>
+        <p:txBody>
+          <a:bodyPr wrap="none" rtlCol="0">
+            <a:spAutoFit/>
+          </a:bodyPr>
+          <a:lstStyle/>
+          <a:p>
+            <a:r>
+              <a:rPr lang="it-IT" sz="1100" dirty="0"/>
+              <a:t>1</a:t>
+            </a:r>
+          </a:p>
+        </p:txBody>
+      </p:sp>
+      <p:sp>
+        <p:nvSpPr>
+          <p:cNvPr id="77" name="CasellaDiTesto 76">
+            <a:extLst>
+              <a:ext uri="{FF2B5EF4-FFF2-40B4-BE49-F238E27FC236}">
+                <a16:creationId xmlns:a16="http://schemas.microsoft.com/office/drawing/2014/main" id="{00EDB28D-3ADA-F894-B555-B079971917D4}"/>
+              </a:ext>
+            </a:extLst>
+          </p:cNvPr>
+          <p:cNvSpPr txBox="1"/>
+          <p:nvPr/>
+        </p:nvSpPr>
+        <p:spPr>
+          <a:xfrm>
+            <a:off x="3364315" y="5333985"/>
+            <a:ext cx="256802" cy="261610"/>
+          </a:xfrm>
+          <a:prstGeom prst="rect">
+            <a:avLst/>
+          </a:prstGeom>
+          <a:noFill/>
+        </p:spPr>
+        <p:txBody>
+          <a:bodyPr wrap="none" rtlCol="0">
+            <a:spAutoFit/>
+          </a:bodyPr>
+          <a:lstStyle/>
+          <a:p>
+            <a:r>
+              <a:rPr lang="it-IT" sz="1100" dirty="0"/>
+              <a:t>2</a:t>
+            </a:r>
+          </a:p>
+        </p:txBody>
+      </p:sp>
+      <p:sp>
+        <p:nvSpPr>
+          <p:cNvPr id="78" name="CasellaDiTesto 77">
+            <a:extLst>
+              <a:ext uri="{FF2B5EF4-FFF2-40B4-BE49-F238E27FC236}">
+                <a16:creationId xmlns:a16="http://schemas.microsoft.com/office/drawing/2014/main" id="{24E1B929-8E61-63A8-2303-1659C7983C88}"/>
+              </a:ext>
+            </a:extLst>
+          </p:cNvPr>
+          <p:cNvSpPr txBox="1"/>
+          <p:nvPr/>
+        </p:nvSpPr>
+        <p:spPr>
+          <a:xfrm>
+            <a:off x="3499807" y="5722594"/>
+            <a:ext cx="256802" cy="261610"/>
+          </a:xfrm>
+          <a:prstGeom prst="rect">
+            <a:avLst/>
+          </a:prstGeom>
+          <a:noFill/>
+        </p:spPr>
+        <p:txBody>
+          <a:bodyPr wrap="none" rtlCol="0">
+            <a:spAutoFit/>
+          </a:bodyPr>
+          <a:lstStyle/>
+          <a:p>
+            <a:r>
+              <a:rPr lang="it-IT" sz="1100" dirty="0"/>
+              <a:t>3</a:t>
+            </a:r>
+          </a:p>
+        </p:txBody>
+      </p:sp>
+      <p:sp>
+        <p:nvSpPr>
+          <p:cNvPr id="79" name="CasellaDiTesto 78">
+            <a:extLst>
+              <a:ext uri="{FF2B5EF4-FFF2-40B4-BE49-F238E27FC236}">
+                <a16:creationId xmlns:a16="http://schemas.microsoft.com/office/drawing/2014/main" id="{D8FE7013-1C83-71A9-E073-64827DEE6CCC}"/>
+              </a:ext>
+            </a:extLst>
+          </p:cNvPr>
+          <p:cNvSpPr txBox="1"/>
+          <p:nvPr/>
+        </p:nvSpPr>
+        <p:spPr>
+          <a:xfrm>
+            <a:off x="3936580" y="5671133"/>
+            <a:ext cx="256802" cy="261610"/>
+          </a:xfrm>
+          <a:prstGeom prst="rect">
+            <a:avLst/>
+          </a:prstGeom>
+          <a:noFill/>
+        </p:spPr>
+        <p:txBody>
+          <a:bodyPr wrap="none" rtlCol="0">
+            <a:spAutoFit/>
+          </a:bodyPr>
+          <a:lstStyle/>
+          <a:p>
+            <a:r>
+              <a:rPr lang="it-IT" sz="1100" dirty="0"/>
+              <a:t>4</a:t>
+            </a:r>
+          </a:p>
+        </p:txBody>
+      </p:sp>
+      <p:cxnSp>
+        <p:nvCxnSpPr>
+          <p:cNvPr id="81" name="Connettore 2 80">
+            <a:extLst>
+              <a:ext uri="{FF2B5EF4-FFF2-40B4-BE49-F238E27FC236}">
+                <a16:creationId xmlns:a16="http://schemas.microsoft.com/office/drawing/2014/main" id="{207B7307-A83D-C340-8F31-76F733C81565}"/>
+              </a:ext>
+            </a:extLst>
+          </p:cNvPr>
+          <p:cNvCxnSpPr>
+            <a:cxnSpLocks/>
+          </p:cNvCxnSpPr>
+          <p:nvPr/>
+        </p:nvCxnSpPr>
+        <p:spPr>
+          <a:xfrm>
+            <a:off x="6357937" y="4499558"/>
+            <a:ext cx="1538288" cy="475139"/>
+          </a:xfrm>
+          <a:prstGeom prst="straightConnector1">
+            <a:avLst/>
+          </a:prstGeom>
+          <a:ln>
+            <a:solidFill>
+              <a:srgbClr val="00B050"/>
+            </a:solidFill>
+            <a:prstDash val="dash"/>
+            <a:tailEnd type="triangle"/>
+          </a:ln>
+        </p:spPr>
+        <p:style>
+          <a:lnRef idx="1">
+            <a:schemeClr val="accent1"/>
+          </a:lnRef>
+          <a:fillRef idx="0">
+            <a:schemeClr val="accent1"/>
+          </a:fillRef>
+          <a:effectRef idx="0">
+            <a:schemeClr val="accent1"/>
+          </a:effectRef>
+          <a:fontRef idx="minor">
+            <a:schemeClr val="tx1"/>
+          </a:fontRef>
+        </p:style>
+      </p:cxnSp>
     </p:spTree>
     <p:extLst>
       <p:ext uri="{BB962C8B-B14F-4D97-AF65-F5344CB8AC3E}">

</xml_diff>